<commit_message>
Add instruction slides for the prime detection task
</commit_message>
<xml_diff>
--- a/EPRIME procedura png/Slajdy_proc1.pptx
+++ b/EPRIME procedura png/Slajdy_proc1.pptx
@@ -8928,7 +8928,7 @@
         </p:spPr>
         <p:txBody>
           <a:bodyPr vert="horz" lIns="91440" tIns="45720" rIns="91440" bIns="45720" rtlCol="0" anchor="ctr" anchorCtr="1">
-            <a:normAutofit/>
+            <a:noAutofit/>
           </a:bodyPr>
           <a:lstStyle>
             <a:lvl1pPr marL="228600" indent="-228600" algn="l" defTabSz="914400" rtl="0" eaLnBrk="1" latinLnBrk="0" hangingPunct="1">
@@ -9100,17 +9100,19 @@
               <a:buNone/>
             </a:pPr>
             <a:r>
-              <a:rPr lang="pl-PL" sz="3200" b="1" dirty="0">
+              <a:rPr lang="pl-PL" sz="6600" dirty="0">
                 <a:solidFill>
                   <a:schemeClr val="bg1"/>
                 </a:solidFill>
+                <a:latin typeface="Bell MT" panose="02020503060305020303" pitchFamily="18" charset="0"/>
               </a:rPr>
               <a:t>+</a:t>
             </a:r>
-            <a:endParaRPr lang="en-US" sz="3200" b="1" dirty="0">
+            <a:endParaRPr lang="en-US" sz="6600" dirty="0">
               <a:solidFill>
                 <a:schemeClr val="bg1"/>
               </a:solidFill>
+              <a:latin typeface="Bell MT" panose="02020503060305020303" pitchFamily="18" charset="0"/>
             </a:endParaRPr>
           </a:p>
         </p:txBody>
@@ -17779,8 +17781,8 @@
         </p:nvSpPr>
         <p:spPr>
           <a:xfrm>
-            <a:off x="1239029" y="1263406"/>
-            <a:ext cx="9713940" cy="1063634"/>
+            <a:off x="1239030" y="1143717"/>
+            <a:ext cx="9713940" cy="1314694"/>
           </a:xfrm>
           <a:prstGeom prst="rect">
             <a:avLst/>
@@ -17788,7 +17790,7 @@
         </p:spPr>
         <p:txBody>
           <a:bodyPr vert="horz" lIns="91440" tIns="45720" rIns="91440" bIns="45720" rtlCol="0">
-            <a:normAutofit fontScale="92500"/>
+            <a:normAutofit lnSpcReduction="10000"/>
           </a:bodyPr>
           <a:lstStyle>
             <a:lvl1pPr marL="228600" indent="-228600" algn="l" defTabSz="914400" rtl="0" eaLnBrk="1" latinLnBrk="0" hangingPunct="1">
@@ -17964,7 +17966,23 @@
                   <a:prstClr val="white"/>
                 </a:solidFill>
               </a:rPr>
-              <a:t>Dodatkowo, w eksperymencie pojawiać się będą tak zwane „prymy podprogowe”, czyli strzałki, które są niewidoczne gołym okiem, są poza świadomością, jednak będą one wpływać na Pani/Pana wybór naciśniętego guzika:</a:t>
+              <a:t>Dodatkowo, w eksperymencie pojawiać się będą tak zwane „prymy podprogowe”, czyli strzałki, </a:t>
+            </a:r>
+            <a:r>
+              <a:rPr lang="pl-PL" sz="2400" dirty="0">
+                <a:solidFill>
+                  <a:schemeClr val="bg1"/>
+                </a:solidFill>
+              </a:rPr>
+              <a:t>które są wyświetlane z taką szybkością, że nie są świadomie dostrzegane, jednak wpływają one na wybór naciśniętego guzika, oraz na szybkość Pani/Pana reakcji </a:t>
+            </a:r>
+            <a:r>
+              <a:rPr lang="pl-PL" sz="2400" dirty="0">
+                <a:solidFill>
+                  <a:prstClr val="white"/>
+                </a:solidFill>
+              </a:rPr>
+              <a:t>:</a:t>
             </a:r>
             <a:endParaRPr kumimoji="0" lang="en-US" sz="2400" b="0" i="0" u="none" strike="noStrike" kern="1200" cap="none" spc="0" normalizeH="0" baseline="0" noProof="0" dirty="0">
               <a:ln>

</xml_diff>

<commit_message>
Adding slides improving the understanding of the main procedure
</commit_message>
<xml_diff>
--- a/EPRIME procedura png/Slajdy_proc1.pptx
+++ b/EPRIME procedura png/Slajdy_proc1.pptx
@@ -5,7 +5,7 @@
     <p:sldMasterId id="2147483648" r:id="rId1"/>
   </p:sldMasterIdLst>
   <p:notesMasterIdLst>
-    <p:notesMasterId r:id="rId26"/>
+    <p:notesMasterId r:id="rId27"/>
   </p:notesMasterIdLst>
   <p:sldIdLst>
     <p:sldId id="256" r:id="rId2"/>
@@ -24,14 +24,15 @@
     <p:sldId id="265" r:id="rId15"/>
     <p:sldId id="268" r:id="rId16"/>
     <p:sldId id="269" r:id="rId17"/>
-    <p:sldId id="270" r:id="rId18"/>
-    <p:sldId id="266" r:id="rId19"/>
-    <p:sldId id="272" r:id="rId20"/>
-    <p:sldId id="273" r:id="rId21"/>
-    <p:sldId id="274" r:id="rId22"/>
-    <p:sldId id="277" r:id="rId23"/>
-    <p:sldId id="275" r:id="rId24"/>
-    <p:sldId id="276" r:id="rId25"/>
+    <p:sldId id="280" r:id="rId18"/>
+    <p:sldId id="270" r:id="rId19"/>
+    <p:sldId id="266" r:id="rId20"/>
+    <p:sldId id="272" r:id="rId21"/>
+    <p:sldId id="273" r:id="rId22"/>
+    <p:sldId id="274" r:id="rId23"/>
+    <p:sldId id="277" r:id="rId24"/>
+    <p:sldId id="275" r:id="rId25"/>
+    <p:sldId id="276" r:id="rId26"/>
   </p:sldIdLst>
   <p:sldSz cx="12192000" cy="6858000"/>
   <p:notesSz cx="6858000" cy="9144000"/>
@@ -220,7 +221,7 @@
           <a:p>
             <a:fld id="{D628A058-5DBC-41CE-B381-E249999ED40E}" type="datetimeFigureOut">
               <a:rPr lang="en-US" smtClean="0"/>
-              <a:t>3/1/2018</a:t>
+              <a:t>23-Mar-18</a:t>
             </a:fld>
             <a:endParaRPr lang="en-US"/>
           </a:p>
@@ -814,7 +815,7 @@
           <a:p>
             <a:fld id="{445E621E-B824-4DF2-A6B1-90CE9D9DDCE7}" type="datetimeFigureOut">
               <a:rPr lang="en-US" smtClean="0"/>
-              <a:t>3/1/2018</a:t>
+              <a:t>23-Mar-18</a:t>
             </a:fld>
             <a:endParaRPr lang="en-US"/>
           </a:p>
@@ -1012,7 +1013,7 @@
           <a:p>
             <a:fld id="{445E621E-B824-4DF2-A6B1-90CE9D9DDCE7}" type="datetimeFigureOut">
               <a:rPr lang="en-US" smtClean="0"/>
-              <a:t>3/1/2018</a:t>
+              <a:t>23-Mar-18</a:t>
             </a:fld>
             <a:endParaRPr lang="en-US"/>
           </a:p>
@@ -1220,7 +1221,7 @@
           <a:p>
             <a:fld id="{445E621E-B824-4DF2-A6B1-90CE9D9DDCE7}" type="datetimeFigureOut">
               <a:rPr lang="en-US" smtClean="0"/>
-              <a:t>3/1/2018</a:t>
+              <a:t>23-Mar-18</a:t>
             </a:fld>
             <a:endParaRPr lang="en-US"/>
           </a:p>
@@ -1418,7 +1419,7 @@
           <a:p>
             <a:fld id="{445E621E-B824-4DF2-A6B1-90CE9D9DDCE7}" type="datetimeFigureOut">
               <a:rPr lang="en-US" smtClean="0"/>
-              <a:t>3/1/2018</a:t>
+              <a:t>23-Mar-18</a:t>
             </a:fld>
             <a:endParaRPr lang="en-US"/>
           </a:p>
@@ -1693,7 +1694,7 @@
           <a:p>
             <a:fld id="{445E621E-B824-4DF2-A6B1-90CE9D9DDCE7}" type="datetimeFigureOut">
               <a:rPr lang="en-US" smtClean="0"/>
-              <a:t>3/1/2018</a:t>
+              <a:t>23-Mar-18</a:t>
             </a:fld>
             <a:endParaRPr lang="en-US"/>
           </a:p>
@@ -1958,7 +1959,7 @@
           <a:p>
             <a:fld id="{445E621E-B824-4DF2-A6B1-90CE9D9DDCE7}" type="datetimeFigureOut">
               <a:rPr lang="en-US" smtClean="0"/>
-              <a:t>3/1/2018</a:t>
+              <a:t>23-Mar-18</a:t>
             </a:fld>
             <a:endParaRPr lang="en-US"/>
           </a:p>
@@ -2370,7 +2371,7 @@
           <a:p>
             <a:fld id="{445E621E-B824-4DF2-A6B1-90CE9D9DDCE7}" type="datetimeFigureOut">
               <a:rPr lang="en-US" smtClean="0"/>
-              <a:t>3/1/2018</a:t>
+              <a:t>23-Mar-18</a:t>
             </a:fld>
             <a:endParaRPr lang="en-US"/>
           </a:p>
@@ -2511,7 +2512,7 @@
           <a:p>
             <a:fld id="{445E621E-B824-4DF2-A6B1-90CE9D9DDCE7}" type="datetimeFigureOut">
               <a:rPr lang="en-US" smtClean="0"/>
-              <a:t>3/1/2018</a:t>
+              <a:t>23-Mar-18</a:t>
             </a:fld>
             <a:endParaRPr lang="en-US"/>
           </a:p>
@@ -2624,7 +2625,7 @@
           <a:p>
             <a:fld id="{445E621E-B824-4DF2-A6B1-90CE9D9DDCE7}" type="datetimeFigureOut">
               <a:rPr lang="en-US" smtClean="0"/>
-              <a:t>3/1/2018</a:t>
+              <a:t>23-Mar-18</a:t>
             </a:fld>
             <a:endParaRPr lang="en-US"/>
           </a:p>
@@ -2935,7 +2936,7 @@
           <a:p>
             <a:fld id="{445E621E-B824-4DF2-A6B1-90CE9D9DDCE7}" type="datetimeFigureOut">
               <a:rPr lang="en-US" smtClean="0"/>
-              <a:t>3/1/2018</a:t>
+              <a:t>23-Mar-18</a:t>
             </a:fld>
             <a:endParaRPr lang="en-US"/>
           </a:p>
@@ -3223,7 +3224,7 @@
           <a:p>
             <a:fld id="{445E621E-B824-4DF2-A6B1-90CE9D9DDCE7}" type="datetimeFigureOut">
               <a:rPr lang="en-US" smtClean="0"/>
-              <a:t>3/1/2018</a:t>
+              <a:t>23-Mar-18</a:t>
             </a:fld>
             <a:endParaRPr lang="en-US"/>
           </a:p>
@@ -3464,7 +3465,7 @@
           <a:p>
             <a:fld id="{445E621E-B824-4DF2-A6B1-90CE9D9DDCE7}" type="datetimeFigureOut">
               <a:rPr lang="en-US" smtClean="0"/>
-              <a:t>3/1/2018</a:t>
+              <a:t>23-Mar-18</a:t>
             </a:fld>
             <a:endParaRPr lang="en-US"/>
           </a:p>
@@ -9909,10 +9910,1003 @@
       </p:grpSpPr>
       <p:sp>
         <p:nvSpPr>
-          <p:cNvPr id="4" name="Content Placeholder 2">
+          <p:cNvPr id="3" name="Content Placeholder 2">
             <a:extLst>
               <a:ext uri="{FF2B5EF4-FFF2-40B4-BE49-F238E27FC236}">
-                <a16:creationId xmlns:a16="http://schemas.microsoft.com/office/drawing/2014/main" id="{46DF36C4-BF62-41C8-87BC-20EB0ECF88CF}"/>
+                <a16:creationId xmlns:a16="http://schemas.microsoft.com/office/drawing/2014/main" id="{16BDB5AA-CFD0-4303-8B7F-ECCF545847F6}"/>
+              </a:ext>
+            </a:extLst>
+          </p:cNvPr>
+          <p:cNvSpPr>
+            <a:spLocks noGrp="1"/>
+          </p:cNvSpPr>
+          <p:nvPr>
+            <p:ph idx="1"/>
+          </p:nvPr>
+        </p:nvSpPr>
+        <p:spPr>
+          <a:xfrm>
+            <a:off x="2123570" y="197128"/>
+            <a:ext cx="7944855" cy="930778"/>
+          </a:xfrm>
+        </p:spPr>
+        <p:txBody>
+          <a:bodyPr>
+            <a:normAutofit/>
+          </a:bodyPr>
+          <a:lstStyle/>
+          <a:p>
+            <a:pPr marL="0" indent="0" algn="ctr">
+              <a:buNone/>
+            </a:pPr>
+            <a:r>
+              <a:rPr lang="pl-PL" sz="2400" dirty="0">
+                <a:solidFill>
+                  <a:schemeClr val="bg1"/>
+                </a:solidFill>
+              </a:rPr>
+              <a:t>Przypominamy</a:t>
+            </a:r>
+            <a:r>
+              <a:rPr lang="en-US" sz="2400" dirty="0">
+                <a:solidFill>
+                  <a:schemeClr val="bg1"/>
+                </a:solidFill>
+              </a:rPr>
+              <a:t>, </a:t>
+            </a:r>
+            <a:r>
+              <a:rPr lang="pl-PL" sz="2400" dirty="0">
+                <a:solidFill>
+                  <a:schemeClr val="bg1"/>
+                </a:solidFill>
+              </a:rPr>
+              <a:t>że teraz koła (efekty Pani/Pana działania) będą miały jeden z 4 kolorów.</a:t>
+            </a:r>
+            <a:endParaRPr lang="en-US" sz="2400" dirty="0">
+              <a:solidFill>
+                <a:schemeClr val="bg1"/>
+              </a:solidFill>
+            </a:endParaRPr>
+          </a:p>
+        </p:txBody>
+      </p:sp>
+      <p:sp>
+        <p:nvSpPr>
+          <p:cNvPr id="7" name="Content Placeholder 2">
+            <a:extLst>
+              <a:ext uri="{FF2B5EF4-FFF2-40B4-BE49-F238E27FC236}">
+                <a16:creationId xmlns:a16="http://schemas.microsoft.com/office/drawing/2014/main" id="{02466EF3-302C-4960-8543-BE397448108A}"/>
+              </a:ext>
+            </a:extLst>
+          </p:cNvPr>
+          <p:cNvSpPr txBox="1">
+            <a:spLocks/>
+          </p:cNvSpPr>
+          <p:nvPr/>
+        </p:nvSpPr>
+        <p:spPr>
+          <a:xfrm>
+            <a:off x="1223986" y="1348896"/>
+            <a:ext cx="9744021" cy="1945190"/>
+          </a:xfrm>
+          <a:prstGeom prst="rect">
+            <a:avLst/>
+          </a:prstGeom>
+        </p:spPr>
+        <p:txBody>
+          <a:bodyPr vert="horz" lIns="91440" tIns="45720" rIns="91440" bIns="45720" rtlCol="0">
+            <a:normAutofit fontScale="92500"/>
+          </a:bodyPr>
+          <a:lstStyle>
+            <a:lvl1pPr marL="228600" indent="-228600" algn="l" defTabSz="914400" rtl="0" eaLnBrk="1" latinLnBrk="0" hangingPunct="1">
+              <a:lnSpc>
+                <a:spcPct val="90000"/>
+              </a:lnSpc>
+              <a:spcBef>
+                <a:spcPts val="1000"/>
+              </a:spcBef>
+              <a:buFont typeface="Arial" panose="020B0604020202020204" pitchFamily="34" charset="0"/>
+              <a:buChar char="•"/>
+              <a:defRPr sz="2800" kern="1200">
+                <a:solidFill>
+                  <a:schemeClr val="tx1"/>
+                </a:solidFill>
+                <a:latin typeface="+mn-lt"/>
+                <a:ea typeface="+mn-ea"/>
+                <a:cs typeface="+mn-cs"/>
+              </a:defRPr>
+            </a:lvl1pPr>
+            <a:lvl2pPr marL="685800" indent="-228600" algn="l" defTabSz="914400" rtl="0" eaLnBrk="1" latinLnBrk="0" hangingPunct="1">
+              <a:lnSpc>
+                <a:spcPct val="90000"/>
+              </a:lnSpc>
+              <a:spcBef>
+                <a:spcPts val="500"/>
+              </a:spcBef>
+              <a:buFont typeface="Arial" panose="020B0604020202020204" pitchFamily="34" charset="0"/>
+              <a:buChar char="•"/>
+              <a:defRPr sz="2400" kern="1200">
+                <a:solidFill>
+                  <a:schemeClr val="tx1"/>
+                </a:solidFill>
+                <a:latin typeface="+mn-lt"/>
+                <a:ea typeface="+mn-ea"/>
+                <a:cs typeface="+mn-cs"/>
+              </a:defRPr>
+            </a:lvl2pPr>
+            <a:lvl3pPr marL="1143000" indent="-228600" algn="l" defTabSz="914400" rtl="0" eaLnBrk="1" latinLnBrk="0" hangingPunct="1">
+              <a:lnSpc>
+                <a:spcPct val="90000"/>
+              </a:lnSpc>
+              <a:spcBef>
+                <a:spcPts val="500"/>
+              </a:spcBef>
+              <a:buFont typeface="Arial" panose="020B0604020202020204" pitchFamily="34" charset="0"/>
+              <a:buChar char="•"/>
+              <a:defRPr sz="2000" kern="1200">
+                <a:solidFill>
+                  <a:schemeClr val="tx1"/>
+                </a:solidFill>
+                <a:latin typeface="+mn-lt"/>
+                <a:ea typeface="+mn-ea"/>
+                <a:cs typeface="+mn-cs"/>
+              </a:defRPr>
+            </a:lvl3pPr>
+            <a:lvl4pPr marL="1600200" indent="-228600" algn="l" defTabSz="914400" rtl="0" eaLnBrk="1" latinLnBrk="0" hangingPunct="1">
+              <a:lnSpc>
+                <a:spcPct val="90000"/>
+              </a:lnSpc>
+              <a:spcBef>
+                <a:spcPts val="500"/>
+              </a:spcBef>
+              <a:buFont typeface="Arial" panose="020B0604020202020204" pitchFamily="34" charset="0"/>
+              <a:buChar char="•"/>
+              <a:defRPr sz="1800" kern="1200">
+                <a:solidFill>
+                  <a:schemeClr val="tx1"/>
+                </a:solidFill>
+                <a:latin typeface="+mn-lt"/>
+                <a:ea typeface="+mn-ea"/>
+                <a:cs typeface="+mn-cs"/>
+              </a:defRPr>
+            </a:lvl4pPr>
+            <a:lvl5pPr marL="2057400" indent="-228600" algn="l" defTabSz="914400" rtl="0" eaLnBrk="1" latinLnBrk="0" hangingPunct="1">
+              <a:lnSpc>
+                <a:spcPct val="90000"/>
+              </a:lnSpc>
+              <a:spcBef>
+                <a:spcPts val="500"/>
+              </a:spcBef>
+              <a:buFont typeface="Arial" panose="020B0604020202020204" pitchFamily="34" charset="0"/>
+              <a:buChar char="•"/>
+              <a:defRPr sz="1800" kern="1200">
+                <a:solidFill>
+                  <a:schemeClr val="tx1"/>
+                </a:solidFill>
+                <a:latin typeface="+mn-lt"/>
+                <a:ea typeface="+mn-ea"/>
+                <a:cs typeface="+mn-cs"/>
+              </a:defRPr>
+            </a:lvl5pPr>
+            <a:lvl6pPr marL="2514600" indent="-228600" algn="l" defTabSz="914400" rtl="0" eaLnBrk="1" latinLnBrk="0" hangingPunct="1">
+              <a:lnSpc>
+                <a:spcPct val="90000"/>
+              </a:lnSpc>
+              <a:spcBef>
+                <a:spcPts val="500"/>
+              </a:spcBef>
+              <a:buFont typeface="Arial" panose="020B0604020202020204" pitchFamily="34" charset="0"/>
+              <a:buChar char="•"/>
+              <a:defRPr sz="1800" kern="1200">
+                <a:solidFill>
+                  <a:schemeClr val="tx1"/>
+                </a:solidFill>
+                <a:latin typeface="+mn-lt"/>
+                <a:ea typeface="+mn-ea"/>
+                <a:cs typeface="+mn-cs"/>
+              </a:defRPr>
+            </a:lvl6pPr>
+            <a:lvl7pPr marL="2971800" indent="-228600" algn="l" defTabSz="914400" rtl="0" eaLnBrk="1" latinLnBrk="0" hangingPunct="1">
+              <a:lnSpc>
+                <a:spcPct val="90000"/>
+              </a:lnSpc>
+              <a:spcBef>
+                <a:spcPts val="500"/>
+              </a:spcBef>
+              <a:buFont typeface="Arial" panose="020B0604020202020204" pitchFamily="34" charset="0"/>
+              <a:buChar char="•"/>
+              <a:defRPr sz="1800" kern="1200">
+                <a:solidFill>
+                  <a:schemeClr val="tx1"/>
+                </a:solidFill>
+                <a:latin typeface="+mn-lt"/>
+                <a:ea typeface="+mn-ea"/>
+                <a:cs typeface="+mn-cs"/>
+              </a:defRPr>
+            </a:lvl7pPr>
+            <a:lvl8pPr marL="3429000" indent="-228600" algn="l" defTabSz="914400" rtl="0" eaLnBrk="1" latinLnBrk="0" hangingPunct="1">
+              <a:lnSpc>
+                <a:spcPct val="90000"/>
+              </a:lnSpc>
+              <a:spcBef>
+                <a:spcPts val="500"/>
+              </a:spcBef>
+              <a:buFont typeface="Arial" panose="020B0604020202020204" pitchFamily="34" charset="0"/>
+              <a:buChar char="•"/>
+              <a:defRPr sz="1800" kern="1200">
+                <a:solidFill>
+                  <a:schemeClr val="tx1"/>
+                </a:solidFill>
+                <a:latin typeface="+mn-lt"/>
+                <a:ea typeface="+mn-ea"/>
+                <a:cs typeface="+mn-cs"/>
+              </a:defRPr>
+            </a:lvl8pPr>
+            <a:lvl9pPr marL="3886200" indent="-228600" algn="l" defTabSz="914400" rtl="0" eaLnBrk="1" latinLnBrk="0" hangingPunct="1">
+              <a:lnSpc>
+                <a:spcPct val="90000"/>
+              </a:lnSpc>
+              <a:spcBef>
+                <a:spcPts val="500"/>
+              </a:spcBef>
+              <a:buFont typeface="Arial" panose="020B0604020202020204" pitchFamily="34" charset="0"/>
+              <a:buChar char="•"/>
+              <a:defRPr sz="1800" kern="1200">
+                <a:solidFill>
+                  <a:schemeClr val="tx1"/>
+                </a:solidFill>
+                <a:latin typeface="+mn-lt"/>
+                <a:ea typeface="+mn-ea"/>
+                <a:cs typeface="+mn-cs"/>
+              </a:defRPr>
+            </a:lvl9pPr>
+          </a:lstStyle>
+          <a:p>
+            <a:pPr marL="0" lvl="0" indent="0" algn="ctr">
+              <a:buNone/>
+            </a:pPr>
+            <a:r>
+              <a:rPr lang="pl-PL" sz="2400" dirty="0">
+                <a:solidFill>
+                  <a:schemeClr val="bg1"/>
+                </a:solidFill>
+              </a:rPr>
+              <a:t>Zadanie eksperymentalne polega na tym, że należy odkryć w jakim stopniu Pani/Pana naciśnięcie lewego, bądź prawego klawisza powodują wyświetlenie się konkretnego koloru.</a:t>
+            </a:r>
+          </a:p>
+          <a:p>
+            <a:pPr marL="0" lvl="0" indent="0" algn="ctr">
+              <a:buNone/>
+            </a:pPr>
+            <a:endParaRPr kumimoji="0" lang="pl-PL" sz="2400" b="0" i="0" u="none" strike="noStrike" kern="1200" cap="none" spc="0" normalizeH="0" baseline="0" noProof="0" dirty="0">
+              <a:ln>
+                <a:noFill/>
+              </a:ln>
+              <a:solidFill>
+                <a:prstClr val="white"/>
+              </a:solidFill>
+              <a:effectLst/>
+              <a:uLnTx/>
+              <a:uFillTx/>
+              <a:latin typeface="Calibri" panose="020F0502020204030204"/>
+              <a:ea typeface="+mn-ea"/>
+              <a:cs typeface="+mn-cs"/>
+            </a:endParaRPr>
+          </a:p>
+          <a:p>
+            <a:pPr marL="0" lvl="0" indent="0" algn="ctr">
+              <a:buNone/>
+            </a:pPr>
+            <a:r>
+              <a:rPr kumimoji="0" lang="pl-PL" sz="2400" b="0" i="0" u="none" strike="noStrike" kern="1200" cap="none" spc="0" normalizeH="0" baseline="0" noProof="0" dirty="0">
+                <a:ln>
+                  <a:noFill/>
+                </a:ln>
+                <a:solidFill>
+                  <a:prstClr val="white"/>
+                </a:solidFill>
+                <a:effectLst/>
+                <a:uLnTx/>
+                <a:uFillTx/>
+                <a:latin typeface="Calibri" panose="020F0502020204030204"/>
+                <a:ea typeface="+mn-ea"/>
+                <a:cs typeface="+mn-cs"/>
+              </a:rPr>
+              <a:t>Prosimy oceniać swoje poczucie kontroli nad wywołaniem danego koloru na skali:</a:t>
+            </a:r>
+            <a:endParaRPr kumimoji="0" lang="en-US" sz="2400" b="0" i="0" u="none" strike="noStrike" kern="1200" cap="none" spc="0" normalizeH="0" baseline="0" noProof="0" dirty="0">
+              <a:ln>
+                <a:noFill/>
+              </a:ln>
+              <a:solidFill>
+                <a:prstClr val="white"/>
+              </a:solidFill>
+              <a:effectLst/>
+              <a:uLnTx/>
+              <a:uFillTx/>
+              <a:latin typeface="Calibri" panose="020F0502020204030204"/>
+              <a:ea typeface="+mn-ea"/>
+              <a:cs typeface="+mn-cs"/>
+            </a:endParaRPr>
+          </a:p>
+        </p:txBody>
+      </p:sp>
+      <p:sp>
+        <p:nvSpPr>
+          <p:cNvPr id="9" name="Content Placeholder 2">
+            <a:extLst>
+              <a:ext uri="{FF2B5EF4-FFF2-40B4-BE49-F238E27FC236}">
+                <a16:creationId xmlns:a16="http://schemas.microsoft.com/office/drawing/2014/main" id="{4EF53457-C4EA-4F98-B682-2CECBF99F20B}"/>
+              </a:ext>
+            </a:extLst>
+          </p:cNvPr>
+          <p:cNvSpPr txBox="1">
+            <a:spLocks/>
+          </p:cNvSpPr>
+          <p:nvPr/>
+        </p:nvSpPr>
+        <p:spPr>
+          <a:xfrm>
+            <a:off x="1223986" y="4753929"/>
+            <a:ext cx="9744021" cy="1064595"/>
+          </a:xfrm>
+          <a:prstGeom prst="rect">
+            <a:avLst/>
+          </a:prstGeom>
+        </p:spPr>
+        <p:txBody>
+          <a:bodyPr vert="horz" lIns="91440" tIns="45720" rIns="91440" bIns="45720" rtlCol="0">
+            <a:normAutofit fontScale="92500"/>
+          </a:bodyPr>
+          <a:lstStyle>
+            <a:lvl1pPr marL="228600" indent="-228600" algn="l" defTabSz="914400" rtl="0" eaLnBrk="1" latinLnBrk="0" hangingPunct="1">
+              <a:lnSpc>
+                <a:spcPct val="90000"/>
+              </a:lnSpc>
+              <a:spcBef>
+                <a:spcPts val="1000"/>
+              </a:spcBef>
+              <a:buFont typeface="Arial" panose="020B0604020202020204" pitchFamily="34" charset="0"/>
+              <a:buChar char="•"/>
+              <a:defRPr sz="2800" kern="1200">
+                <a:solidFill>
+                  <a:schemeClr val="tx1"/>
+                </a:solidFill>
+                <a:latin typeface="+mn-lt"/>
+                <a:ea typeface="+mn-ea"/>
+                <a:cs typeface="+mn-cs"/>
+              </a:defRPr>
+            </a:lvl1pPr>
+            <a:lvl2pPr marL="685800" indent="-228600" algn="l" defTabSz="914400" rtl="0" eaLnBrk="1" latinLnBrk="0" hangingPunct="1">
+              <a:lnSpc>
+                <a:spcPct val="90000"/>
+              </a:lnSpc>
+              <a:spcBef>
+                <a:spcPts val="500"/>
+              </a:spcBef>
+              <a:buFont typeface="Arial" panose="020B0604020202020204" pitchFamily="34" charset="0"/>
+              <a:buChar char="•"/>
+              <a:defRPr sz="2400" kern="1200">
+                <a:solidFill>
+                  <a:schemeClr val="tx1"/>
+                </a:solidFill>
+                <a:latin typeface="+mn-lt"/>
+                <a:ea typeface="+mn-ea"/>
+                <a:cs typeface="+mn-cs"/>
+              </a:defRPr>
+            </a:lvl2pPr>
+            <a:lvl3pPr marL="1143000" indent="-228600" algn="l" defTabSz="914400" rtl="0" eaLnBrk="1" latinLnBrk="0" hangingPunct="1">
+              <a:lnSpc>
+                <a:spcPct val="90000"/>
+              </a:lnSpc>
+              <a:spcBef>
+                <a:spcPts val="500"/>
+              </a:spcBef>
+              <a:buFont typeface="Arial" panose="020B0604020202020204" pitchFamily="34" charset="0"/>
+              <a:buChar char="•"/>
+              <a:defRPr sz="2000" kern="1200">
+                <a:solidFill>
+                  <a:schemeClr val="tx1"/>
+                </a:solidFill>
+                <a:latin typeface="+mn-lt"/>
+                <a:ea typeface="+mn-ea"/>
+                <a:cs typeface="+mn-cs"/>
+              </a:defRPr>
+            </a:lvl3pPr>
+            <a:lvl4pPr marL="1600200" indent="-228600" algn="l" defTabSz="914400" rtl="0" eaLnBrk="1" latinLnBrk="0" hangingPunct="1">
+              <a:lnSpc>
+                <a:spcPct val="90000"/>
+              </a:lnSpc>
+              <a:spcBef>
+                <a:spcPts val="500"/>
+              </a:spcBef>
+              <a:buFont typeface="Arial" panose="020B0604020202020204" pitchFamily="34" charset="0"/>
+              <a:buChar char="•"/>
+              <a:defRPr sz="1800" kern="1200">
+                <a:solidFill>
+                  <a:schemeClr val="tx1"/>
+                </a:solidFill>
+                <a:latin typeface="+mn-lt"/>
+                <a:ea typeface="+mn-ea"/>
+                <a:cs typeface="+mn-cs"/>
+              </a:defRPr>
+            </a:lvl4pPr>
+            <a:lvl5pPr marL="2057400" indent="-228600" algn="l" defTabSz="914400" rtl="0" eaLnBrk="1" latinLnBrk="0" hangingPunct="1">
+              <a:lnSpc>
+                <a:spcPct val="90000"/>
+              </a:lnSpc>
+              <a:spcBef>
+                <a:spcPts val="500"/>
+              </a:spcBef>
+              <a:buFont typeface="Arial" panose="020B0604020202020204" pitchFamily="34" charset="0"/>
+              <a:buChar char="•"/>
+              <a:defRPr sz="1800" kern="1200">
+                <a:solidFill>
+                  <a:schemeClr val="tx1"/>
+                </a:solidFill>
+                <a:latin typeface="+mn-lt"/>
+                <a:ea typeface="+mn-ea"/>
+                <a:cs typeface="+mn-cs"/>
+              </a:defRPr>
+            </a:lvl5pPr>
+            <a:lvl6pPr marL="2514600" indent="-228600" algn="l" defTabSz="914400" rtl="0" eaLnBrk="1" latinLnBrk="0" hangingPunct="1">
+              <a:lnSpc>
+                <a:spcPct val="90000"/>
+              </a:lnSpc>
+              <a:spcBef>
+                <a:spcPts val="500"/>
+              </a:spcBef>
+              <a:buFont typeface="Arial" panose="020B0604020202020204" pitchFamily="34" charset="0"/>
+              <a:buChar char="•"/>
+              <a:defRPr sz="1800" kern="1200">
+                <a:solidFill>
+                  <a:schemeClr val="tx1"/>
+                </a:solidFill>
+                <a:latin typeface="+mn-lt"/>
+                <a:ea typeface="+mn-ea"/>
+                <a:cs typeface="+mn-cs"/>
+              </a:defRPr>
+            </a:lvl6pPr>
+            <a:lvl7pPr marL="2971800" indent="-228600" algn="l" defTabSz="914400" rtl="0" eaLnBrk="1" latinLnBrk="0" hangingPunct="1">
+              <a:lnSpc>
+                <a:spcPct val="90000"/>
+              </a:lnSpc>
+              <a:spcBef>
+                <a:spcPts val="500"/>
+              </a:spcBef>
+              <a:buFont typeface="Arial" panose="020B0604020202020204" pitchFamily="34" charset="0"/>
+              <a:buChar char="•"/>
+              <a:defRPr sz="1800" kern="1200">
+                <a:solidFill>
+                  <a:schemeClr val="tx1"/>
+                </a:solidFill>
+                <a:latin typeface="+mn-lt"/>
+                <a:ea typeface="+mn-ea"/>
+                <a:cs typeface="+mn-cs"/>
+              </a:defRPr>
+            </a:lvl7pPr>
+            <a:lvl8pPr marL="3429000" indent="-228600" algn="l" defTabSz="914400" rtl="0" eaLnBrk="1" latinLnBrk="0" hangingPunct="1">
+              <a:lnSpc>
+                <a:spcPct val="90000"/>
+              </a:lnSpc>
+              <a:spcBef>
+                <a:spcPts val="500"/>
+              </a:spcBef>
+              <a:buFont typeface="Arial" panose="020B0604020202020204" pitchFamily="34" charset="0"/>
+              <a:buChar char="•"/>
+              <a:defRPr sz="1800" kern="1200">
+                <a:solidFill>
+                  <a:schemeClr val="tx1"/>
+                </a:solidFill>
+                <a:latin typeface="+mn-lt"/>
+                <a:ea typeface="+mn-ea"/>
+                <a:cs typeface="+mn-cs"/>
+              </a:defRPr>
+            </a:lvl8pPr>
+            <a:lvl9pPr marL="3886200" indent="-228600" algn="l" defTabSz="914400" rtl="0" eaLnBrk="1" latinLnBrk="0" hangingPunct="1">
+              <a:lnSpc>
+                <a:spcPct val="90000"/>
+              </a:lnSpc>
+              <a:spcBef>
+                <a:spcPts val="500"/>
+              </a:spcBef>
+              <a:buFont typeface="Arial" panose="020B0604020202020204" pitchFamily="34" charset="0"/>
+              <a:buChar char="•"/>
+              <a:defRPr sz="1800" kern="1200">
+                <a:solidFill>
+                  <a:schemeClr val="tx1"/>
+                </a:solidFill>
+                <a:latin typeface="+mn-lt"/>
+                <a:ea typeface="+mn-ea"/>
+                <a:cs typeface="+mn-cs"/>
+              </a:defRPr>
+            </a:lvl9pPr>
+          </a:lstStyle>
+          <a:p>
+            <a:pPr marL="0" marR="0" lvl="0" indent="0" algn="ctr" defTabSz="914400" rtl="0" eaLnBrk="1" fontAlgn="auto" latinLnBrk="0" hangingPunct="1">
+              <a:lnSpc>
+                <a:spcPct val="90000"/>
+              </a:lnSpc>
+              <a:spcBef>
+                <a:spcPts val="1000"/>
+              </a:spcBef>
+              <a:spcAft>
+                <a:spcPts val="0"/>
+              </a:spcAft>
+              <a:buClrTx/>
+              <a:buSzTx/>
+              <a:buFont typeface="Arial" panose="020B0604020202020204" pitchFamily="34" charset="0"/>
+              <a:buNone/>
+              <a:tabLst/>
+              <a:defRPr/>
+            </a:pPr>
+            <a:r>
+              <a:rPr kumimoji="0" lang="pl-PL" sz="2400" b="0" i="0" u="none" strike="noStrike" kern="1200" cap="none" spc="0" normalizeH="0" baseline="0" noProof="0" dirty="0">
+                <a:ln>
+                  <a:noFill/>
+                </a:ln>
+                <a:solidFill>
+                  <a:prstClr val="white"/>
+                </a:solidFill>
+                <a:effectLst/>
+                <a:uLnTx/>
+                <a:uFillTx/>
+                <a:latin typeface="Calibri" panose="020F0502020204030204"/>
+                <a:ea typeface="+mn-ea"/>
+                <a:cs typeface="+mn-cs"/>
+              </a:rPr>
+              <a:t>Po skali porusza się używając klawiszy „</a:t>
+            </a:r>
+            <a:r>
+              <a:rPr kumimoji="0" lang="en-US" sz="2400" b="0" i="0" u="none" strike="noStrike" kern="1200" cap="none" spc="0" normalizeH="0" baseline="0" noProof="0" dirty="0">
+                <a:ln>
+                  <a:noFill/>
+                </a:ln>
+                <a:solidFill>
+                  <a:prstClr val="white"/>
+                </a:solidFill>
+                <a:effectLst/>
+                <a:uLnTx/>
+                <a:uFillTx/>
+                <a:latin typeface="Calibri" panose="020F0502020204030204"/>
+                <a:ea typeface="+mn-ea"/>
+                <a:cs typeface="+mn-cs"/>
+              </a:rPr>
+              <a:t>D</a:t>
+            </a:r>
+            <a:r>
+              <a:rPr kumimoji="0" lang="pl-PL" sz="2400" b="0" i="0" u="none" strike="noStrike" kern="1200" cap="none" spc="0" normalizeH="0" baseline="0" noProof="0" dirty="0">
+                <a:ln>
+                  <a:noFill/>
+                </a:ln>
+                <a:solidFill>
+                  <a:prstClr val="white"/>
+                </a:solidFill>
+                <a:effectLst/>
+                <a:uLnTx/>
+                <a:uFillTx/>
+                <a:latin typeface="Calibri" panose="020F0502020204030204"/>
+                <a:ea typeface="+mn-ea"/>
+                <a:cs typeface="+mn-cs"/>
+              </a:rPr>
+              <a:t>” (lewo) i „</a:t>
+            </a:r>
+            <a:r>
+              <a:rPr kumimoji="0" lang="en-US" sz="2400" b="0" i="0" u="none" strike="noStrike" kern="1200" cap="none" spc="0" normalizeH="0" baseline="0" noProof="0" dirty="0">
+                <a:ln>
+                  <a:noFill/>
+                </a:ln>
+                <a:solidFill>
+                  <a:prstClr val="white"/>
+                </a:solidFill>
+                <a:effectLst/>
+                <a:uLnTx/>
+                <a:uFillTx/>
+                <a:latin typeface="Calibri" panose="020F0502020204030204"/>
+                <a:ea typeface="+mn-ea"/>
+                <a:cs typeface="+mn-cs"/>
+              </a:rPr>
+              <a:t>L</a:t>
+            </a:r>
+            <a:r>
+              <a:rPr kumimoji="0" lang="pl-PL" sz="2400" b="0" i="0" u="none" strike="noStrike" kern="1200" cap="none" spc="0" normalizeH="0" baseline="0" noProof="0" dirty="0">
+                <a:ln>
+                  <a:noFill/>
+                </a:ln>
+                <a:solidFill>
+                  <a:prstClr val="white"/>
+                </a:solidFill>
+                <a:effectLst/>
+                <a:uLnTx/>
+                <a:uFillTx/>
+                <a:latin typeface="Calibri" panose="020F0502020204030204"/>
+                <a:ea typeface="+mn-ea"/>
+                <a:cs typeface="+mn-cs"/>
+              </a:rPr>
+              <a:t>” (prawo)</a:t>
+            </a:r>
+            <a:r>
+              <a:rPr kumimoji="0" lang="en-US" sz="2400" b="0" i="0" u="none" strike="noStrike" kern="1200" cap="none" spc="0" normalizeH="0" baseline="0" noProof="0" dirty="0">
+                <a:ln>
+                  <a:noFill/>
+                </a:ln>
+                <a:solidFill>
+                  <a:prstClr val="white"/>
+                </a:solidFill>
+                <a:effectLst/>
+                <a:uLnTx/>
+                <a:uFillTx/>
+                <a:latin typeface="Calibri" panose="020F0502020204030204"/>
+                <a:ea typeface="+mn-ea"/>
+                <a:cs typeface="+mn-cs"/>
+              </a:rPr>
+              <a:t>, </a:t>
+            </a:r>
+            <a:r>
+              <a:rPr kumimoji="0" lang="en-US" sz="2400" b="0" i="0" u="none" strike="noStrike" kern="1200" cap="none" spc="0" normalizeH="0" baseline="0" noProof="0" dirty="0" err="1">
+                <a:ln>
+                  <a:noFill/>
+                </a:ln>
+                <a:solidFill>
+                  <a:prstClr val="white"/>
+                </a:solidFill>
+                <a:effectLst/>
+                <a:uLnTx/>
+                <a:uFillTx/>
+                <a:latin typeface="Calibri" panose="020F0502020204030204"/>
+                <a:ea typeface="+mn-ea"/>
+                <a:cs typeface="+mn-cs"/>
+              </a:rPr>
+              <a:t>wyb</a:t>
+            </a:r>
+            <a:r>
+              <a:rPr kumimoji="0" lang="pl-PL" sz="2400" b="0" i="0" u="none" strike="noStrike" kern="1200" cap="none" spc="0" normalizeH="0" baseline="0" noProof="0" dirty="0" err="1">
+                <a:ln>
+                  <a:noFill/>
+                </a:ln>
+                <a:solidFill>
+                  <a:prstClr val="white"/>
+                </a:solidFill>
+                <a:effectLst/>
+                <a:uLnTx/>
+                <a:uFillTx/>
+                <a:latin typeface="Calibri" panose="020F0502020204030204"/>
+                <a:ea typeface="+mn-ea"/>
+                <a:cs typeface="+mn-cs"/>
+              </a:rPr>
+              <a:t>ór</a:t>
+            </a:r>
+            <a:r>
+              <a:rPr kumimoji="0" lang="pl-PL" sz="2400" b="0" i="0" u="none" strike="noStrike" kern="1200" cap="none" spc="0" normalizeH="0" baseline="0" noProof="0" dirty="0">
+                <a:ln>
+                  <a:noFill/>
+                </a:ln>
+                <a:solidFill>
+                  <a:prstClr val="white"/>
+                </a:solidFill>
+                <a:effectLst/>
+                <a:uLnTx/>
+                <a:uFillTx/>
+                <a:latin typeface="Calibri" panose="020F0502020204030204"/>
+                <a:ea typeface="+mn-ea"/>
+                <a:cs typeface="+mn-cs"/>
+              </a:rPr>
+              <a:t> zatwierdza się „SPACJĄ”. </a:t>
+            </a:r>
+            <a:r>
+              <a:rPr kumimoji="0" lang="pl-PL" sz="2400" b="1" i="0" u="none" strike="noStrike" kern="1200" cap="none" spc="0" normalizeH="0" baseline="0" noProof="0" dirty="0">
+                <a:ln>
+                  <a:noFill/>
+                </a:ln>
+                <a:solidFill>
+                  <a:prstClr val="white"/>
+                </a:solidFill>
+                <a:effectLst/>
+                <a:uLnTx/>
+                <a:uFillTx/>
+                <a:latin typeface="Calibri" panose="020F0502020204030204"/>
+                <a:ea typeface="+mn-ea"/>
+                <a:cs typeface="+mn-cs"/>
+              </a:rPr>
+              <a:t>Bardzo prosimy o używanie CAŁEJ skali, czyli używanie jej w sposób zróżnicowany, nie tylko punktów skrajnych, bądź najbliższych środka</a:t>
+            </a:r>
+            <a:r>
+              <a:rPr kumimoji="0" lang="pl-PL" sz="2400" b="0" i="0" u="none" strike="noStrike" kern="1200" cap="none" spc="0" normalizeH="0" baseline="0" noProof="0" dirty="0">
+                <a:ln>
+                  <a:noFill/>
+                </a:ln>
+                <a:solidFill>
+                  <a:prstClr val="white"/>
+                </a:solidFill>
+                <a:effectLst/>
+                <a:uLnTx/>
+                <a:uFillTx/>
+                <a:latin typeface="Calibri" panose="020F0502020204030204"/>
+                <a:ea typeface="+mn-ea"/>
+                <a:cs typeface="+mn-cs"/>
+              </a:rPr>
+              <a:t>.</a:t>
+            </a:r>
+            <a:endParaRPr kumimoji="0" lang="en-US" sz="2400" b="0" i="0" u="none" strike="noStrike" kern="1200" cap="none" spc="0" normalizeH="0" baseline="0" noProof="0" dirty="0">
+              <a:ln>
+                <a:noFill/>
+              </a:ln>
+              <a:solidFill>
+                <a:prstClr val="white"/>
+              </a:solidFill>
+              <a:effectLst/>
+              <a:uLnTx/>
+              <a:uFillTx/>
+              <a:latin typeface="Calibri" panose="020F0502020204030204"/>
+              <a:ea typeface="+mn-ea"/>
+              <a:cs typeface="+mn-cs"/>
+            </a:endParaRPr>
+          </a:p>
+        </p:txBody>
+      </p:sp>
+      <p:sp>
+        <p:nvSpPr>
+          <p:cNvPr id="10" name="Content Placeholder 2">
+            <a:extLst>
+              <a:ext uri="{FF2B5EF4-FFF2-40B4-BE49-F238E27FC236}">
+                <a16:creationId xmlns:a16="http://schemas.microsoft.com/office/drawing/2014/main" id="{D509D985-8D79-4F4F-B16C-CBD1ED1FBCF6}"/>
+              </a:ext>
+            </a:extLst>
+          </p:cNvPr>
+          <p:cNvSpPr txBox="1">
+            <a:spLocks/>
+          </p:cNvSpPr>
+          <p:nvPr/>
+        </p:nvSpPr>
+        <p:spPr>
+          <a:xfrm>
+            <a:off x="1800724" y="3653669"/>
+            <a:ext cx="8590546" cy="740677"/>
+          </a:xfrm>
+          <a:prstGeom prst="rect">
+            <a:avLst/>
+          </a:prstGeom>
+        </p:spPr>
+        <p:txBody>
+          <a:bodyPr vert="horz" lIns="91440" tIns="45720" rIns="91440" bIns="45720" rtlCol="0">
+            <a:normAutofit fontScale="92500" lnSpcReduction="10000"/>
+          </a:bodyPr>
+          <a:lstStyle>
+            <a:lvl1pPr marL="228600" indent="-228600" algn="l" defTabSz="914400" rtl="0" eaLnBrk="1" latinLnBrk="0" hangingPunct="1">
+              <a:lnSpc>
+                <a:spcPct val="90000"/>
+              </a:lnSpc>
+              <a:spcBef>
+                <a:spcPts val="1000"/>
+              </a:spcBef>
+              <a:buFont typeface="Arial" panose="020B0604020202020204" pitchFamily="34" charset="0"/>
+              <a:buChar char="•"/>
+              <a:defRPr sz="2800" kern="1200">
+                <a:solidFill>
+                  <a:schemeClr val="tx1"/>
+                </a:solidFill>
+                <a:latin typeface="+mn-lt"/>
+                <a:ea typeface="+mn-ea"/>
+                <a:cs typeface="+mn-cs"/>
+              </a:defRPr>
+            </a:lvl1pPr>
+            <a:lvl2pPr marL="685800" indent="-228600" algn="l" defTabSz="914400" rtl="0" eaLnBrk="1" latinLnBrk="0" hangingPunct="1">
+              <a:lnSpc>
+                <a:spcPct val="90000"/>
+              </a:lnSpc>
+              <a:spcBef>
+                <a:spcPts val="500"/>
+              </a:spcBef>
+              <a:buFont typeface="Arial" panose="020B0604020202020204" pitchFamily="34" charset="0"/>
+              <a:buChar char="•"/>
+              <a:defRPr sz="2400" kern="1200">
+                <a:solidFill>
+                  <a:schemeClr val="tx1"/>
+                </a:solidFill>
+                <a:latin typeface="+mn-lt"/>
+                <a:ea typeface="+mn-ea"/>
+                <a:cs typeface="+mn-cs"/>
+              </a:defRPr>
+            </a:lvl2pPr>
+            <a:lvl3pPr marL="1143000" indent="-228600" algn="l" defTabSz="914400" rtl="0" eaLnBrk="1" latinLnBrk="0" hangingPunct="1">
+              <a:lnSpc>
+                <a:spcPct val="90000"/>
+              </a:lnSpc>
+              <a:spcBef>
+                <a:spcPts val="500"/>
+              </a:spcBef>
+              <a:buFont typeface="Arial" panose="020B0604020202020204" pitchFamily="34" charset="0"/>
+              <a:buChar char="•"/>
+              <a:defRPr sz="2000" kern="1200">
+                <a:solidFill>
+                  <a:schemeClr val="tx1"/>
+                </a:solidFill>
+                <a:latin typeface="+mn-lt"/>
+                <a:ea typeface="+mn-ea"/>
+                <a:cs typeface="+mn-cs"/>
+              </a:defRPr>
+            </a:lvl3pPr>
+            <a:lvl4pPr marL="1600200" indent="-228600" algn="l" defTabSz="914400" rtl="0" eaLnBrk="1" latinLnBrk="0" hangingPunct="1">
+              <a:lnSpc>
+                <a:spcPct val="90000"/>
+              </a:lnSpc>
+              <a:spcBef>
+                <a:spcPts val="500"/>
+              </a:spcBef>
+              <a:buFont typeface="Arial" panose="020B0604020202020204" pitchFamily="34" charset="0"/>
+              <a:buChar char="•"/>
+              <a:defRPr sz="1800" kern="1200">
+                <a:solidFill>
+                  <a:schemeClr val="tx1"/>
+                </a:solidFill>
+                <a:latin typeface="+mn-lt"/>
+                <a:ea typeface="+mn-ea"/>
+                <a:cs typeface="+mn-cs"/>
+              </a:defRPr>
+            </a:lvl4pPr>
+            <a:lvl5pPr marL="2057400" indent="-228600" algn="l" defTabSz="914400" rtl="0" eaLnBrk="1" latinLnBrk="0" hangingPunct="1">
+              <a:lnSpc>
+                <a:spcPct val="90000"/>
+              </a:lnSpc>
+              <a:spcBef>
+                <a:spcPts val="500"/>
+              </a:spcBef>
+              <a:buFont typeface="Arial" panose="020B0604020202020204" pitchFamily="34" charset="0"/>
+              <a:buChar char="•"/>
+              <a:defRPr sz="1800" kern="1200">
+                <a:solidFill>
+                  <a:schemeClr val="tx1"/>
+                </a:solidFill>
+                <a:latin typeface="+mn-lt"/>
+                <a:ea typeface="+mn-ea"/>
+                <a:cs typeface="+mn-cs"/>
+              </a:defRPr>
+            </a:lvl5pPr>
+            <a:lvl6pPr marL="2514600" indent="-228600" algn="l" defTabSz="914400" rtl="0" eaLnBrk="1" latinLnBrk="0" hangingPunct="1">
+              <a:lnSpc>
+                <a:spcPct val="90000"/>
+              </a:lnSpc>
+              <a:spcBef>
+                <a:spcPts val="500"/>
+              </a:spcBef>
+              <a:buFont typeface="Arial" panose="020B0604020202020204" pitchFamily="34" charset="0"/>
+              <a:buChar char="•"/>
+              <a:defRPr sz="1800" kern="1200">
+                <a:solidFill>
+                  <a:schemeClr val="tx1"/>
+                </a:solidFill>
+                <a:latin typeface="+mn-lt"/>
+                <a:ea typeface="+mn-ea"/>
+                <a:cs typeface="+mn-cs"/>
+              </a:defRPr>
+            </a:lvl6pPr>
+            <a:lvl7pPr marL="2971800" indent="-228600" algn="l" defTabSz="914400" rtl="0" eaLnBrk="1" latinLnBrk="0" hangingPunct="1">
+              <a:lnSpc>
+                <a:spcPct val="90000"/>
+              </a:lnSpc>
+              <a:spcBef>
+                <a:spcPts val="500"/>
+              </a:spcBef>
+              <a:buFont typeface="Arial" panose="020B0604020202020204" pitchFamily="34" charset="0"/>
+              <a:buChar char="•"/>
+              <a:defRPr sz="1800" kern="1200">
+                <a:solidFill>
+                  <a:schemeClr val="tx1"/>
+                </a:solidFill>
+                <a:latin typeface="+mn-lt"/>
+                <a:ea typeface="+mn-ea"/>
+                <a:cs typeface="+mn-cs"/>
+              </a:defRPr>
+            </a:lvl7pPr>
+            <a:lvl8pPr marL="3429000" indent="-228600" algn="l" defTabSz="914400" rtl="0" eaLnBrk="1" latinLnBrk="0" hangingPunct="1">
+              <a:lnSpc>
+                <a:spcPct val="90000"/>
+              </a:lnSpc>
+              <a:spcBef>
+                <a:spcPts val="500"/>
+              </a:spcBef>
+              <a:buFont typeface="Arial" panose="020B0604020202020204" pitchFamily="34" charset="0"/>
+              <a:buChar char="•"/>
+              <a:defRPr sz="1800" kern="1200">
+                <a:solidFill>
+                  <a:schemeClr val="tx1"/>
+                </a:solidFill>
+                <a:latin typeface="+mn-lt"/>
+                <a:ea typeface="+mn-ea"/>
+                <a:cs typeface="+mn-cs"/>
+              </a:defRPr>
+            </a:lvl8pPr>
+            <a:lvl9pPr marL="3886200" indent="-228600" algn="l" defTabSz="914400" rtl="0" eaLnBrk="1" latinLnBrk="0" hangingPunct="1">
+              <a:lnSpc>
+                <a:spcPct val="90000"/>
+              </a:lnSpc>
+              <a:spcBef>
+                <a:spcPts val="500"/>
+              </a:spcBef>
+              <a:buFont typeface="Arial" panose="020B0604020202020204" pitchFamily="34" charset="0"/>
+              <a:buChar char="•"/>
+              <a:defRPr sz="1800" kern="1200">
+                <a:solidFill>
+                  <a:schemeClr val="tx1"/>
+                </a:solidFill>
+                <a:latin typeface="+mn-lt"/>
+                <a:ea typeface="+mn-ea"/>
+                <a:cs typeface="+mn-cs"/>
+              </a:defRPr>
+            </a:lvl9pPr>
+          </a:lstStyle>
+          <a:p>
+            <a:pPr marL="0" marR="0" lvl="0" indent="0" algn="ctr" defTabSz="914400" rtl="0" eaLnBrk="1" fontAlgn="auto" latinLnBrk="0" hangingPunct="1">
+              <a:lnSpc>
+                <a:spcPct val="90000"/>
+              </a:lnSpc>
+              <a:spcBef>
+                <a:spcPts val="1000"/>
+              </a:spcBef>
+              <a:spcAft>
+                <a:spcPts val="0"/>
+              </a:spcAft>
+              <a:buClrTx/>
+              <a:buSzTx/>
+              <a:buFont typeface="Arial" panose="020B0604020202020204" pitchFamily="34" charset="0"/>
+              <a:buNone/>
+              <a:tabLst/>
+              <a:defRPr/>
+            </a:pPr>
+            <a:endParaRPr kumimoji="0" lang="en-US" sz="5400" b="0" i="0" u="none" strike="noStrike" kern="1200" cap="none" spc="0" normalizeH="0" baseline="0" noProof="0" dirty="0">
+              <a:ln>
+                <a:noFill/>
+              </a:ln>
+              <a:solidFill>
+                <a:srgbClr val="FF0000"/>
+              </a:solidFill>
+              <a:effectLst/>
+              <a:uLnTx/>
+              <a:uFillTx/>
+              <a:latin typeface="Calibri" panose="020F0502020204030204"/>
+              <a:ea typeface="+mn-ea"/>
+              <a:cs typeface="+mn-cs"/>
+            </a:endParaRPr>
+          </a:p>
+        </p:txBody>
+      </p:sp>
+      <p:pic>
+        <p:nvPicPr>
+          <p:cNvPr id="2" name="Picture 1">
+            <a:extLst>
+              <a:ext uri="{FF2B5EF4-FFF2-40B4-BE49-F238E27FC236}">
+                <a16:creationId xmlns:a16="http://schemas.microsoft.com/office/drawing/2014/main" id="{E8756F97-DA66-4705-98BF-14ABCD4D7DCA}"/>
+              </a:ext>
+            </a:extLst>
+          </p:cNvPr>
+          <p:cNvPicPr>
+            <a:picLocks noChangeAspect="1"/>
+          </p:cNvPicPr>
+          <p:nvPr/>
+        </p:nvPicPr>
+        <p:blipFill>
+          <a:blip r:embed="rId2"/>
+          <a:stretch>
+            <a:fillRect/>
+          </a:stretch>
+        </p:blipFill>
+        <p:spPr>
+          <a:xfrm>
+            <a:off x="3552822" y="3294086"/>
+            <a:ext cx="5086350" cy="1504950"/>
+          </a:xfrm>
+          <a:prstGeom prst="rect">
+            <a:avLst/>
+          </a:prstGeom>
+        </p:spPr>
+      </p:pic>
+      <p:sp>
+        <p:nvSpPr>
+          <p:cNvPr id="11" name="Content Placeholder 2">
+            <a:extLst>
+              <a:ext uri="{FF2B5EF4-FFF2-40B4-BE49-F238E27FC236}">
+                <a16:creationId xmlns:a16="http://schemas.microsoft.com/office/drawing/2014/main" id="{45F9B9AB-32F4-41B5-BEB2-F8CFAA6565AD}"/>
               </a:ext>
             </a:extLst>
           </p:cNvPr>
@@ -10099,272 +11093,225 @@
             </a:lvl9pPr>
           </a:lstStyle>
           <a:p>
-            <a:pPr marL="0" indent="0" algn="ctr">
+            <a:pPr marL="0" marR="0" lvl="0" indent="0" algn="ctr" defTabSz="914400" rtl="0" eaLnBrk="1" fontAlgn="auto" latinLnBrk="0" hangingPunct="1">
+              <a:lnSpc>
+                <a:spcPct val="90000"/>
+              </a:lnSpc>
+              <a:spcBef>
+                <a:spcPts val="1000"/>
+              </a:spcBef>
+              <a:spcAft>
+                <a:spcPts val="0"/>
+              </a:spcAft>
+              <a:buClrTx/>
+              <a:buSzTx/>
               <a:buFont typeface="Arial" panose="020B0604020202020204" pitchFamily="34" charset="0"/>
               <a:buNone/>
+              <a:tabLst/>
+              <a:defRPr/>
             </a:pPr>
             <a:r>
-              <a:rPr lang="pl-PL" sz="2000" dirty="0">
-                <a:solidFill>
-                  <a:srgbClr val="FF0000"/>
-                </a:solidFill>
-              </a:rPr>
-              <a:t>Proszę nacisnąć „L”, aby ROZPOCZĄĆ EKSPERYMENT…</a:t>
+              <a:rPr kumimoji="0" lang="pl-PL" sz="2000" b="0" i="0" u="none" strike="noStrike" kern="1200" cap="none" spc="0" normalizeH="0" baseline="0" noProof="0" dirty="0">
+                <a:ln>
+                  <a:noFill/>
+                </a:ln>
+                <a:solidFill>
+                  <a:prstClr val="white"/>
+                </a:solidFill>
+                <a:effectLst/>
+                <a:uLnTx/>
+                <a:uFillTx/>
+                <a:latin typeface="Calibri" panose="020F0502020204030204"/>
+                <a:ea typeface="+mn-ea"/>
+                <a:cs typeface="+mn-cs"/>
+              </a:rPr>
+              <a:t>Proszę nacisnąć </a:t>
+            </a:r>
+            <a:r>
+              <a:rPr kumimoji="0" lang="en-US" sz="2000" b="0" i="0" u="none" strike="noStrike" kern="1200" cap="none" spc="0" normalizeH="0" baseline="0" noProof="0" dirty="0" err="1">
+                <a:ln>
+                  <a:noFill/>
+                </a:ln>
+                <a:solidFill>
+                  <a:prstClr val="white"/>
+                </a:solidFill>
+                <a:effectLst/>
+                <a:uLnTx/>
+                <a:uFillTx/>
+                <a:latin typeface="Calibri" panose="020F0502020204030204"/>
+                <a:ea typeface="+mn-ea"/>
+                <a:cs typeface="+mn-cs"/>
+              </a:rPr>
+              <a:t>klawisz</a:t>
+            </a:r>
+            <a:r>
+              <a:rPr kumimoji="0" lang="pl-PL" sz="2000" b="0" i="0" u="none" strike="noStrike" kern="1200" cap="none" spc="0" normalizeH="0" baseline="0" noProof="0" dirty="0">
+                <a:ln>
+                  <a:noFill/>
+                </a:ln>
+                <a:solidFill>
+                  <a:prstClr val="white"/>
+                </a:solidFill>
+                <a:effectLst/>
+                <a:uLnTx/>
+                <a:uFillTx/>
+                <a:latin typeface="Calibri" panose="020F0502020204030204"/>
+                <a:ea typeface="+mn-ea"/>
+                <a:cs typeface="+mn-cs"/>
+              </a:rPr>
+              <a:t> „</a:t>
+            </a:r>
+            <a:r>
+              <a:rPr kumimoji="0" lang="en-US" sz="2000" b="0" i="0" u="none" strike="noStrike" kern="1200" cap="none" spc="0" normalizeH="0" baseline="0" noProof="0" dirty="0">
+                <a:ln>
+                  <a:noFill/>
+                </a:ln>
+                <a:solidFill>
+                  <a:prstClr val="white"/>
+                </a:solidFill>
+                <a:effectLst/>
+                <a:uLnTx/>
+                <a:uFillTx/>
+                <a:latin typeface="Calibri" panose="020F0502020204030204"/>
+                <a:ea typeface="+mn-ea"/>
+                <a:cs typeface="+mn-cs"/>
+              </a:rPr>
+              <a:t>L</a:t>
+            </a:r>
+            <a:r>
+              <a:rPr kumimoji="0" lang="pl-PL" sz="2000" b="0" i="0" u="none" strike="noStrike" kern="1200" cap="none" spc="0" normalizeH="0" baseline="0" noProof="0" dirty="0">
+                <a:ln>
+                  <a:noFill/>
+                </a:ln>
+                <a:solidFill>
+                  <a:prstClr val="white"/>
+                </a:solidFill>
+                <a:effectLst/>
+                <a:uLnTx/>
+                <a:uFillTx/>
+                <a:latin typeface="Calibri" panose="020F0502020204030204"/>
+                <a:ea typeface="+mn-ea"/>
+                <a:cs typeface="+mn-cs"/>
+              </a:rPr>
+              <a:t>”, aby kontynuować…</a:t>
             </a:r>
           </a:p>
           <a:p>
-            <a:pPr marL="0" indent="0" algn="ctr">
+            <a:pPr marL="0" marR="0" lvl="0" indent="0" algn="ctr" defTabSz="914400" rtl="0" eaLnBrk="1" fontAlgn="auto" latinLnBrk="0" hangingPunct="1">
+              <a:lnSpc>
+                <a:spcPct val="90000"/>
+              </a:lnSpc>
+              <a:spcBef>
+                <a:spcPts val="1000"/>
+              </a:spcBef>
+              <a:spcAft>
+                <a:spcPts val="0"/>
+              </a:spcAft>
+              <a:buClrTx/>
+              <a:buSzTx/>
               <a:buFont typeface="Arial" panose="020B0604020202020204" pitchFamily="34" charset="0"/>
               <a:buNone/>
+              <a:tabLst/>
+              <a:defRPr/>
             </a:pPr>
             <a:r>
-              <a:rPr lang="pl-PL" sz="2000" dirty="0">
-                <a:solidFill>
-                  <a:srgbClr val="FF0000"/>
-                </a:solidFill>
-              </a:rPr>
-              <a:t>lub „D”, aby cofnąć się do poprzedniego slajdu…</a:t>
-            </a:r>
-            <a:endParaRPr lang="en-US" sz="2000" dirty="0">
+              <a:rPr kumimoji="0" lang="pl-PL" sz="2000" b="0" i="0" u="none" strike="noStrike" kern="1200" cap="none" spc="0" normalizeH="0" baseline="0" noProof="0" dirty="0">
+                <a:ln>
+                  <a:noFill/>
+                </a:ln>
+                <a:solidFill>
+                  <a:prstClr val="white"/>
+                </a:solidFill>
+                <a:effectLst/>
+                <a:uLnTx/>
+                <a:uFillTx/>
+                <a:latin typeface="Calibri" panose="020F0502020204030204"/>
+                <a:ea typeface="+mn-ea"/>
+                <a:cs typeface="+mn-cs"/>
+              </a:rPr>
+              <a:t>lub </a:t>
+            </a:r>
+            <a:r>
+              <a:rPr kumimoji="0" lang="en-US" sz="2000" b="0" i="0" u="none" strike="noStrike" kern="1200" cap="none" spc="0" normalizeH="0" baseline="0" noProof="0" dirty="0" err="1">
+                <a:ln>
+                  <a:noFill/>
+                </a:ln>
+                <a:solidFill>
+                  <a:prstClr val="white"/>
+                </a:solidFill>
+                <a:effectLst/>
+                <a:uLnTx/>
+                <a:uFillTx/>
+                <a:latin typeface="Calibri" panose="020F0502020204030204"/>
+                <a:ea typeface="+mn-ea"/>
+                <a:cs typeface="+mn-cs"/>
+              </a:rPr>
+              <a:t>klawisz</a:t>
+            </a:r>
+            <a:r>
+              <a:rPr kumimoji="0" lang="pl-PL" sz="2000" b="0" i="0" u="none" strike="noStrike" kern="1200" cap="none" spc="0" normalizeH="0" baseline="0" noProof="0" dirty="0">
+                <a:ln>
+                  <a:noFill/>
+                </a:ln>
+                <a:solidFill>
+                  <a:prstClr val="white"/>
+                </a:solidFill>
+                <a:effectLst/>
+                <a:uLnTx/>
+                <a:uFillTx/>
+                <a:latin typeface="Calibri" panose="020F0502020204030204"/>
+                <a:ea typeface="+mn-ea"/>
+                <a:cs typeface="+mn-cs"/>
+              </a:rPr>
+              <a:t> „</a:t>
+            </a:r>
+            <a:r>
+              <a:rPr kumimoji="0" lang="en-US" sz="2000" b="0" i="0" u="none" strike="noStrike" kern="1200" cap="none" spc="0" normalizeH="0" baseline="0" noProof="0" dirty="0">
+                <a:ln>
+                  <a:noFill/>
+                </a:ln>
+                <a:solidFill>
+                  <a:prstClr val="white"/>
+                </a:solidFill>
+                <a:effectLst/>
+                <a:uLnTx/>
+                <a:uFillTx/>
+                <a:latin typeface="Calibri" panose="020F0502020204030204"/>
+                <a:ea typeface="+mn-ea"/>
+                <a:cs typeface="+mn-cs"/>
+              </a:rPr>
+              <a:t>D</a:t>
+            </a:r>
+            <a:r>
+              <a:rPr kumimoji="0" lang="pl-PL" sz="2000" b="0" i="0" u="none" strike="noStrike" kern="1200" cap="none" spc="0" normalizeH="0" baseline="0" noProof="0" dirty="0">
+                <a:ln>
+                  <a:noFill/>
+                </a:ln>
+                <a:solidFill>
+                  <a:prstClr val="white"/>
+                </a:solidFill>
+                <a:effectLst/>
+                <a:uLnTx/>
+                <a:uFillTx/>
+                <a:latin typeface="Calibri" panose="020F0502020204030204"/>
+                <a:ea typeface="+mn-ea"/>
+                <a:cs typeface="+mn-cs"/>
+              </a:rPr>
+              <a:t>”, aby cofnąć się do poprzedniego slajdu…</a:t>
+            </a:r>
+            <a:endParaRPr kumimoji="0" lang="en-US" sz="2000" b="0" i="0" u="none" strike="noStrike" kern="1200" cap="none" spc="0" normalizeH="0" baseline="0" noProof="0" dirty="0">
+              <a:ln>
+                <a:noFill/>
+              </a:ln>
               <a:solidFill>
-                <a:srgbClr val="FF0000"/>
+                <a:prstClr val="white"/>
               </a:solidFill>
-            </a:endParaRPr>
-          </a:p>
-        </p:txBody>
-      </p:sp>
-      <p:sp>
-        <p:nvSpPr>
-          <p:cNvPr id="7" name="Content Placeholder 2">
-            <a:extLst>
-              <a:ext uri="{FF2B5EF4-FFF2-40B4-BE49-F238E27FC236}">
-                <a16:creationId xmlns:a16="http://schemas.microsoft.com/office/drawing/2014/main" id="{02466EF3-302C-4960-8543-BE397448108A}"/>
-              </a:ext>
-            </a:extLst>
-          </p:cNvPr>
-          <p:cNvSpPr txBox="1">
-            <a:spLocks/>
-          </p:cNvSpPr>
-          <p:nvPr/>
-        </p:nvSpPr>
-        <p:spPr>
-          <a:xfrm>
-            <a:off x="1800727" y="3058661"/>
-            <a:ext cx="8590546" cy="740677"/>
-          </a:xfrm>
-          <a:prstGeom prst="rect">
-            <a:avLst/>
-          </a:prstGeom>
-        </p:spPr>
-        <p:txBody>
-          <a:bodyPr vert="horz" lIns="91440" tIns="45720" rIns="91440" bIns="45720" rtlCol="0">
-            <a:normAutofit lnSpcReduction="10000"/>
-          </a:bodyPr>
-          <a:lstStyle>
-            <a:lvl1pPr marL="228600" indent="-228600" algn="l" defTabSz="914400" rtl="0" eaLnBrk="1" latinLnBrk="0" hangingPunct="1">
-              <a:lnSpc>
-                <a:spcPct val="90000"/>
-              </a:lnSpc>
-              <a:spcBef>
-                <a:spcPts val="1000"/>
-              </a:spcBef>
-              <a:buFont typeface="Arial" panose="020B0604020202020204" pitchFamily="34" charset="0"/>
-              <a:buChar char="•"/>
-              <a:defRPr sz="2800" kern="1200">
-                <a:solidFill>
-                  <a:schemeClr val="tx1"/>
-                </a:solidFill>
-                <a:latin typeface="+mn-lt"/>
-                <a:ea typeface="+mn-ea"/>
-                <a:cs typeface="+mn-cs"/>
-              </a:defRPr>
-            </a:lvl1pPr>
-            <a:lvl2pPr marL="685800" indent="-228600" algn="l" defTabSz="914400" rtl="0" eaLnBrk="1" latinLnBrk="0" hangingPunct="1">
-              <a:lnSpc>
-                <a:spcPct val="90000"/>
-              </a:lnSpc>
-              <a:spcBef>
-                <a:spcPts val="500"/>
-              </a:spcBef>
-              <a:buFont typeface="Arial" panose="020B0604020202020204" pitchFamily="34" charset="0"/>
-              <a:buChar char="•"/>
-              <a:defRPr sz="2400" kern="1200">
-                <a:solidFill>
-                  <a:schemeClr val="tx1"/>
-                </a:solidFill>
-                <a:latin typeface="+mn-lt"/>
-                <a:ea typeface="+mn-ea"/>
-                <a:cs typeface="+mn-cs"/>
-              </a:defRPr>
-            </a:lvl2pPr>
-            <a:lvl3pPr marL="1143000" indent="-228600" algn="l" defTabSz="914400" rtl="0" eaLnBrk="1" latinLnBrk="0" hangingPunct="1">
-              <a:lnSpc>
-                <a:spcPct val="90000"/>
-              </a:lnSpc>
-              <a:spcBef>
-                <a:spcPts val="500"/>
-              </a:spcBef>
-              <a:buFont typeface="Arial" panose="020B0604020202020204" pitchFamily="34" charset="0"/>
-              <a:buChar char="•"/>
-              <a:defRPr sz="2000" kern="1200">
-                <a:solidFill>
-                  <a:schemeClr val="tx1"/>
-                </a:solidFill>
-                <a:latin typeface="+mn-lt"/>
-                <a:ea typeface="+mn-ea"/>
-                <a:cs typeface="+mn-cs"/>
-              </a:defRPr>
-            </a:lvl3pPr>
-            <a:lvl4pPr marL="1600200" indent="-228600" algn="l" defTabSz="914400" rtl="0" eaLnBrk="1" latinLnBrk="0" hangingPunct="1">
-              <a:lnSpc>
-                <a:spcPct val="90000"/>
-              </a:lnSpc>
-              <a:spcBef>
-                <a:spcPts val="500"/>
-              </a:spcBef>
-              <a:buFont typeface="Arial" panose="020B0604020202020204" pitchFamily="34" charset="0"/>
-              <a:buChar char="•"/>
-              <a:defRPr sz="1800" kern="1200">
-                <a:solidFill>
-                  <a:schemeClr val="tx1"/>
-                </a:solidFill>
-                <a:latin typeface="+mn-lt"/>
-                <a:ea typeface="+mn-ea"/>
-                <a:cs typeface="+mn-cs"/>
-              </a:defRPr>
-            </a:lvl4pPr>
-            <a:lvl5pPr marL="2057400" indent="-228600" algn="l" defTabSz="914400" rtl="0" eaLnBrk="1" latinLnBrk="0" hangingPunct="1">
-              <a:lnSpc>
-                <a:spcPct val="90000"/>
-              </a:lnSpc>
-              <a:spcBef>
-                <a:spcPts val="500"/>
-              </a:spcBef>
-              <a:buFont typeface="Arial" panose="020B0604020202020204" pitchFamily="34" charset="0"/>
-              <a:buChar char="•"/>
-              <a:defRPr sz="1800" kern="1200">
-                <a:solidFill>
-                  <a:schemeClr val="tx1"/>
-                </a:solidFill>
-                <a:latin typeface="+mn-lt"/>
-                <a:ea typeface="+mn-ea"/>
-                <a:cs typeface="+mn-cs"/>
-              </a:defRPr>
-            </a:lvl5pPr>
-            <a:lvl6pPr marL="2514600" indent="-228600" algn="l" defTabSz="914400" rtl="0" eaLnBrk="1" latinLnBrk="0" hangingPunct="1">
-              <a:lnSpc>
-                <a:spcPct val="90000"/>
-              </a:lnSpc>
-              <a:spcBef>
-                <a:spcPts val="500"/>
-              </a:spcBef>
-              <a:buFont typeface="Arial" panose="020B0604020202020204" pitchFamily="34" charset="0"/>
-              <a:buChar char="•"/>
-              <a:defRPr sz="1800" kern="1200">
-                <a:solidFill>
-                  <a:schemeClr val="tx1"/>
-                </a:solidFill>
-                <a:latin typeface="+mn-lt"/>
-                <a:ea typeface="+mn-ea"/>
-                <a:cs typeface="+mn-cs"/>
-              </a:defRPr>
-            </a:lvl6pPr>
-            <a:lvl7pPr marL="2971800" indent="-228600" algn="l" defTabSz="914400" rtl="0" eaLnBrk="1" latinLnBrk="0" hangingPunct="1">
-              <a:lnSpc>
-                <a:spcPct val="90000"/>
-              </a:lnSpc>
-              <a:spcBef>
-                <a:spcPts val="500"/>
-              </a:spcBef>
-              <a:buFont typeface="Arial" panose="020B0604020202020204" pitchFamily="34" charset="0"/>
-              <a:buChar char="•"/>
-              <a:defRPr sz="1800" kern="1200">
-                <a:solidFill>
-                  <a:schemeClr val="tx1"/>
-                </a:solidFill>
-                <a:latin typeface="+mn-lt"/>
-                <a:ea typeface="+mn-ea"/>
-                <a:cs typeface="+mn-cs"/>
-              </a:defRPr>
-            </a:lvl7pPr>
-            <a:lvl8pPr marL="3429000" indent="-228600" algn="l" defTabSz="914400" rtl="0" eaLnBrk="1" latinLnBrk="0" hangingPunct="1">
-              <a:lnSpc>
-                <a:spcPct val="90000"/>
-              </a:lnSpc>
-              <a:spcBef>
-                <a:spcPts val="500"/>
-              </a:spcBef>
-              <a:buFont typeface="Arial" panose="020B0604020202020204" pitchFamily="34" charset="0"/>
-              <a:buChar char="•"/>
-              <a:defRPr sz="1800" kern="1200">
-                <a:solidFill>
-                  <a:schemeClr val="tx1"/>
-                </a:solidFill>
-                <a:latin typeface="+mn-lt"/>
-                <a:ea typeface="+mn-ea"/>
-                <a:cs typeface="+mn-cs"/>
-              </a:defRPr>
-            </a:lvl8pPr>
-            <a:lvl9pPr marL="3886200" indent="-228600" algn="l" defTabSz="914400" rtl="0" eaLnBrk="1" latinLnBrk="0" hangingPunct="1">
-              <a:lnSpc>
-                <a:spcPct val="90000"/>
-              </a:lnSpc>
-              <a:spcBef>
-                <a:spcPts val="500"/>
-              </a:spcBef>
-              <a:buFont typeface="Arial" panose="020B0604020202020204" pitchFamily="34" charset="0"/>
-              <a:buChar char="•"/>
-              <a:defRPr sz="1800" kern="1200">
-                <a:solidFill>
-                  <a:schemeClr val="tx1"/>
-                </a:solidFill>
-                <a:latin typeface="+mn-lt"/>
-                <a:ea typeface="+mn-ea"/>
-                <a:cs typeface="+mn-cs"/>
-              </a:defRPr>
-            </a:lvl9pPr>
-          </a:lstStyle>
-          <a:p>
-            <a:pPr marL="0" indent="0" algn="ctr">
-              <a:buFont typeface="Arial" panose="020B0604020202020204" pitchFamily="34" charset="0"/>
-              <a:buNone/>
-            </a:pPr>
-            <a:r>
-              <a:rPr lang="pl-PL" sz="2400" dirty="0">
-                <a:solidFill>
-                  <a:schemeClr val="bg1"/>
-                </a:solidFill>
-              </a:rPr>
-              <a:t>Proszę</a:t>
-            </a:r>
-            <a:r>
-              <a:rPr lang="en-US" sz="2400" dirty="0">
-                <a:solidFill>
-                  <a:schemeClr val="bg1"/>
-                </a:solidFill>
-              </a:rPr>
-              <a:t> </a:t>
-            </a:r>
-            <a:r>
-              <a:rPr lang="en-US" sz="2400" dirty="0" err="1">
-                <a:solidFill>
-                  <a:schemeClr val="bg1"/>
-                </a:solidFill>
-              </a:rPr>
-              <a:t>teraz</a:t>
-            </a:r>
-            <a:r>
-              <a:rPr lang="pl-PL" sz="2400" dirty="0">
-                <a:solidFill>
-                  <a:schemeClr val="bg1"/>
-                </a:solidFill>
-              </a:rPr>
-              <a:t> położyć palec wskazujący lewej ręki na klawiszu „D” na klawiaturze, a prawej ręki na klawiszu „L”.</a:t>
-            </a:r>
-            <a:endParaRPr lang="en-US" sz="2400" dirty="0">
-              <a:solidFill>
-                <a:schemeClr val="bg1"/>
-              </a:solidFill>
+              <a:effectLst/>
+              <a:uLnTx/>
+              <a:uFillTx/>
+              <a:latin typeface="Calibri" panose="020F0502020204030204"/>
+              <a:ea typeface="+mn-ea"/>
+              <a:cs typeface="+mn-cs"/>
             </a:endParaRPr>
           </a:p>
         </p:txBody>
@@ -10372,7 +11319,7 @@
     </p:spTree>
     <p:extLst>
       <p:ext uri="{BB962C8B-B14F-4D97-AF65-F5344CB8AC3E}">
-        <p14:creationId xmlns:p14="http://schemas.microsoft.com/office/powerpoint/2010/main" val="4220115985"/>
+        <p14:creationId xmlns:p14="http://schemas.microsoft.com/office/powerpoint/2010/main" val="2035428680"/>
       </p:ext>
     </p:extLst>
   </p:cSld>
@@ -10383,98 +11330,6 @@
 </file>
 
 <file path=ppt/slides/slide18.xml><?xml version="1.0" encoding="utf-8"?>
-<p:sld xmlns:a="http://schemas.openxmlformats.org/drawingml/2006/main" xmlns:r="http://schemas.openxmlformats.org/officeDocument/2006/relationships" xmlns:p="http://schemas.openxmlformats.org/presentationml/2006/main">
-  <p:cSld>
-    <p:spTree>
-      <p:nvGrpSpPr>
-        <p:cNvPr id="1" name=""/>
-        <p:cNvGrpSpPr/>
-        <p:nvPr/>
-      </p:nvGrpSpPr>
-      <p:grpSpPr>
-        <a:xfrm>
-          <a:off x="0" y="0"/>
-          <a:ext cx="0" cy="0"/>
-          <a:chOff x="0" y="0"/>
-          <a:chExt cx="0" cy="0"/>
-        </a:xfrm>
-      </p:grpSpPr>
-      <p:sp>
-        <p:nvSpPr>
-          <p:cNvPr id="2" name="Title 1">
-            <a:extLst>
-              <a:ext uri="{FF2B5EF4-FFF2-40B4-BE49-F238E27FC236}">
-                <a16:creationId xmlns:a16="http://schemas.microsoft.com/office/drawing/2014/main" id="{E497033F-4B7C-43D5-8BCB-CEF91A534120}"/>
-              </a:ext>
-            </a:extLst>
-          </p:cNvPr>
-          <p:cNvSpPr>
-            <a:spLocks noGrp="1"/>
-          </p:cNvSpPr>
-          <p:nvPr>
-            <p:ph type="title"/>
-          </p:nvPr>
-        </p:nvSpPr>
-        <p:spPr/>
-        <p:txBody>
-          <a:bodyPr/>
-          <a:lstStyle/>
-          <a:p>
-            <a:r>
-              <a:rPr lang="pl-PL" dirty="0"/>
-              <a:t>Slajdy wewnątrz </a:t>
-            </a:r>
-            <a:r>
-              <a:rPr lang="pl-PL" dirty="0" err="1"/>
-              <a:t>triali</a:t>
-            </a:r>
-            <a:r>
-              <a:rPr lang="pl-PL" dirty="0"/>
-              <a:t> (końce bloków)</a:t>
-            </a:r>
-            <a:endParaRPr lang="en-US" dirty="0"/>
-          </a:p>
-        </p:txBody>
-      </p:sp>
-      <p:sp>
-        <p:nvSpPr>
-          <p:cNvPr id="3" name="Content Placeholder 2">
-            <a:extLst>
-              <a:ext uri="{FF2B5EF4-FFF2-40B4-BE49-F238E27FC236}">
-                <a16:creationId xmlns:a16="http://schemas.microsoft.com/office/drawing/2014/main" id="{4442F038-6072-4A5A-BA30-02286A83305C}"/>
-              </a:ext>
-            </a:extLst>
-          </p:cNvPr>
-          <p:cNvSpPr>
-            <a:spLocks noGrp="1"/>
-          </p:cNvSpPr>
-          <p:nvPr>
-            <p:ph idx="1"/>
-          </p:nvPr>
-        </p:nvSpPr>
-        <p:spPr/>
-        <p:txBody>
-          <a:bodyPr/>
-          <a:lstStyle/>
-          <a:p>
-            <a:endParaRPr lang="en-US"/>
-          </a:p>
-        </p:txBody>
-      </p:sp>
-    </p:spTree>
-    <p:extLst>
-      <p:ext uri="{BB962C8B-B14F-4D97-AF65-F5344CB8AC3E}">
-        <p14:creationId xmlns:p14="http://schemas.microsoft.com/office/powerpoint/2010/main" val="314155207"/>
-      </p:ext>
-    </p:extLst>
-  </p:cSld>
-  <p:clrMapOvr>
-    <a:masterClrMapping/>
-  </p:clrMapOvr>
-</p:sld>
-</file>
-
-<file path=ppt/slides/slide19.xml><?xml version="1.0" encoding="utf-8"?>
 <p:sld xmlns:a="http://schemas.openxmlformats.org/drawingml/2006/main" xmlns:r="http://schemas.openxmlformats.org/officeDocument/2006/relationships" xmlns:p="http://schemas.openxmlformats.org/presentationml/2006/main">
   <p:cSld>
     <p:bg>
@@ -10524,7 +11379,7 @@
         </p:spPr>
         <p:txBody>
           <a:bodyPr vert="horz" lIns="91440" tIns="45720" rIns="91440" bIns="45720" rtlCol="0">
-            <a:normAutofit/>
+            <a:normAutofit lnSpcReduction="10000"/>
           </a:bodyPr>
           <a:lstStyle>
             <a:lvl1pPr marL="228600" indent="-228600" algn="l" defTabSz="914400" rtl="0" eaLnBrk="1" latinLnBrk="0" hangingPunct="1">
@@ -10698,11 +11553,30 @@
             <a:r>
               <a:rPr lang="pl-PL" sz="2000" dirty="0">
                 <a:solidFill>
-                  <a:schemeClr val="bg1"/>
-                </a:solidFill>
-              </a:rPr>
-              <a:t>Proszę nacisnąć „L”, aby kontynuować…</a:t>
-            </a:r>
+                  <a:srgbClr val="FF0000"/>
+                </a:solidFill>
+              </a:rPr>
+              <a:t>Proszę nacisnąć „L”, aby ROZPOCZĄĆ EKSPERYMENT…</a:t>
+            </a:r>
+          </a:p>
+          <a:p>
+            <a:pPr marL="0" indent="0" algn="ctr">
+              <a:buFont typeface="Arial" panose="020B0604020202020204" pitchFamily="34" charset="0"/>
+              <a:buNone/>
+            </a:pPr>
+            <a:r>
+              <a:rPr lang="pl-PL" sz="2000" dirty="0">
+                <a:solidFill>
+                  <a:srgbClr val="FF0000"/>
+                </a:solidFill>
+              </a:rPr>
+              <a:t>lub „D”, aby cofnąć się do poprzedniego slajdu…</a:t>
+            </a:r>
+            <a:endParaRPr lang="en-US" sz="2000" dirty="0">
+              <a:solidFill>
+                <a:srgbClr val="FF0000"/>
+              </a:solidFill>
+            </a:endParaRPr>
           </a:p>
         </p:txBody>
       </p:sp>
@@ -10722,7 +11596,7 @@
         </p:nvSpPr>
         <p:spPr>
           <a:xfrm>
-            <a:off x="1800723" y="1408634"/>
+            <a:off x="1800727" y="3058661"/>
             <a:ext cx="8590546" cy="740677"/>
           </a:xfrm>
           <a:prstGeom prst="rect">
@@ -10731,7 +11605,7 @@
         </p:spPr>
         <p:txBody>
           <a:bodyPr vert="horz" lIns="91440" tIns="45720" rIns="91440" bIns="45720" rtlCol="0">
-            <a:normAutofit/>
+            <a:normAutofit lnSpcReduction="10000"/>
           </a:bodyPr>
           <a:lstStyle>
             <a:lvl1pPr marL="228600" indent="-228600" algn="l" defTabSz="914400" rtl="0" eaLnBrk="1" latinLnBrk="0" hangingPunct="1">
@@ -10908,7 +11782,23 @@
                   <a:schemeClr val="bg1"/>
                 </a:solidFill>
               </a:rPr>
-              <a:t>Dziękujemy!</a:t>
+              <a:t>Proszę</a:t>
+            </a:r>
+            <a:r>
+              <a:rPr lang="en-US" sz="2400" dirty="0">
+                <a:solidFill>
+                  <a:schemeClr val="bg1"/>
+                </a:solidFill>
+              </a:rPr>
+              <a:t> </a:t>
+            </a:r>
+            <a:r>
+              <a:rPr lang="pl-PL" sz="2400" dirty="0">
+                <a:solidFill>
+                  <a:schemeClr val="bg1"/>
+                </a:solidFill>
+              </a:rPr>
+              <a:t>teraz położyć palec wskazujący lewej ręki na klawiszu „D” na klawiaturze, a prawej ręki na klawiszu „L”.</a:t>
             </a:r>
             <a:endParaRPr lang="en-US" sz="2400" dirty="0">
               <a:solidFill>
@@ -10918,262 +11808,102 @@
           </a:p>
         </p:txBody>
       </p:sp>
+    </p:spTree>
+    <p:extLst>
+      <p:ext uri="{BB962C8B-B14F-4D97-AF65-F5344CB8AC3E}">
+        <p14:creationId xmlns:p14="http://schemas.microsoft.com/office/powerpoint/2010/main" val="4220115985"/>
+      </p:ext>
+    </p:extLst>
+  </p:cSld>
+  <p:clrMapOvr>
+    <a:masterClrMapping/>
+  </p:clrMapOvr>
+</p:sld>
+</file>
+
+<file path=ppt/slides/slide19.xml><?xml version="1.0" encoding="utf-8"?>
+<p:sld xmlns:a="http://schemas.openxmlformats.org/drawingml/2006/main" xmlns:r="http://schemas.openxmlformats.org/officeDocument/2006/relationships" xmlns:p="http://schemas.openxmlformats.org/presentationml/2006/main">
+  <p:cSld>
+    <p:spTree>
+      <p:nvGrpSpPr>
+        <p:cNvPr id="1" name=""/>
+        <p:cNvGrpSpPr/>
+        <p:nvPr/>
+      </p:nvGrpSpPr>
+      <p:grpSpPr>
+        <a:xfrm>
+          <a:off x="0" y="0"/>
+          <a:ext cx="0" cy="0"/>
+          <a:chOff x="0" y="0"/>
+          <a:chExt cx="0" cy="0"/>
+        </a:xfrm>
+      </p:grpSpPr>
       <p:sp>
         <p:nvSpPr>
-          <p:cNvPr id="9" name="Content Placeholder 2">
+          <p:cNvPr id="2" name="Title 1">
             <a:extLst>
               <a:ext uri="{FF2B5EF4-FFF2-40B4-BE49-F238E27FC236}">
-                <a16:creationId xmlns:a16="http://schemas.microsoft.com/office/drawing/2014/main" id="{6AE46264-68D9-4CE3-A51C-8EC1E628ABC6}"/>
+                <a16:creationId xmlns:a16="http://schemas.microsoft.com/office/drawing/2014/main" id="{E497033F-4B7C-43D5-8BCB-CEF91A534120}"/>
               </a:ext>
             </a:extLst>
           </p:cNvPr>
-          <p:cNvSpPr txBox="1">
-            <a:spLocks/>
+          <p:cNvSpPr>
+            <a:spLocks noGrp="1"/>
           </p:cNvSpPr>
-          <p:nvPr/>
+          <p:nvPr>
+            <p:ph type="title"/>
+          </p:nvPr>
         </p:nvSpPr>
-        <p:spPr>
-          <a:xfrm>
-            <a:off x="3031459" y="2476476"/>
-            <a:ext cx="6129074" cy="1078624"/>
-          </a:xfrm>
-          <a:prstGeom prst="rect">
-            <a:avLst/>
-          </a:prstGeom>
-        </p:spPr>
+        <p:spPr/>
         <p:txBody>
-          <a:bodyPr vert="horz" lIns="91440" tIns="45720" rIns="91440" bIns="45720" rtlCol="0">
-            <a:normAutofit/>
-          </a:bodyPr>
-          <a:lstStyle>
-            <a:lvl1pPr marL="228600" indent="-228600" algn="l" defTabSz="914400" rtl="0" eaLnBrk="1" latinLnBrk="0" hangingPunct="1">
-              <a:lnSpc>
-                <a:spcPct val="90000"/>
-              </a:lnSpc>
-              <a:spcBef>
-                <a:spcPts val="1000"/>
-              </a:spcBef>
-              <a:buFont typeface="Arial" panose="020B0604020202020204" pitchFamily="34" charset="0"/>
-              <a:buChar char="•"/>
-              <a:defRPr sz="2800" kern="1200">
-                <a:solidFill>
-                  <a:schemeClr val="tx1"/>
-                </a:solidFill>
-                <a:latin typeface="+mn-lt"/>
-                <a:ea typeface="+mn-ea"/>
-                <a:cs typeface="+mn-cs"/>
-              </a:defRPr>
-            </a:lvl1pPr>
-            <a:lvl2pPr marL="685800" indent="-228600" algn="l" defTabSz="914400" rtl="0" eaLnBrk="1" latinLnBrk="0" hangingPunct="1">
-              <a:lnSpc>
-                <a:spcPct val="90000"/>
-              </a:lnSpc>
-              <a:spcBef>
-                <a:spcPts val="500"/>
-              </a:spcBef>
-              <a:buFont typeface="Arial" panose="020B0604020202020204" pitchFamily="34" charset="0"/>
-              <a:buChar char="•"/>
-              <a:defRPr sz="2400" kern="1200">
-                <a:solidFill>
-                  <a:schemeClr val="tx1"/>
-                </a:solidFill>
-                <a:latin typeface="+mn-lt"/>
-                <a:ea typeface="+mn-ea"/>
-                <a:cs typeface="+mn-cs"/>
-              </a:defRPr>
-            </a:lvl2pPr>
-            <a:lvl3pPr marL="1143000" indent="-228600" algn="l" defTabSz="914400" rtl="0" eaLnBrk="1" latinLnBrk="0" hangingPunct="1">
-              <a:lnSpc>
-                <a:spcPct val="90000"/>
-              </a:lnSpc>
-              <a:spcBef>
-                <a:spcPts val="500"/>
-              </a:spcBef>
-              <a:buFont typeface="Arial" panose="020B0604020202020204" pitchFamily="34" charset="0"/>
-              <a:buChar char="•"/>
-              <a:defRPr sz="2000" kern="1200">
-                <a:solidFill>
-                  <a:schemeClr val="tx1"/>
-                </a:solidFill>
-                <a:latin typeface="+mn-lt"/>
-                <a:ea typeface="+mn-ea"/>
-                <a:cs typeface="+mn-cs"/>
-              </a:defRPr>
-            </a:lvl3pPr>
-            <a:lvl4pPr marL="1600200" indent="-228600" algn="l" defTabSz="914400" rtl="0" eaLnBrk="1" latinLnBrk="0" hangingPunct="1">
-              <a:lnSpc>
-                <a:spcPct val="90000"/>
-              </a:lnSpc>
-              <a:spcBef>
-                <a:spcPts val="500"/>
-              </a:spcBef>
-              <a:buFont typeface="Arial" panose="020B0604020202020204" pitchFamily="34" charset="0"/>
-              <a:buChar char="•"/>
-              <a:defRPr sz="1800" kern="1200">
-                <a:solidFill>
-                  <a:schemeClr val="tx1"/>
-                </a:solidFill>
-                <a:latin typeface="+mn-lt"/>
-                <a:ea typeface="+mn-ea"/>
-                <a:cs typeface="+mn-cs"/>
-              </a:defRPr>
-            </a:lvl4pPr>
-            <a:lvl5pPr marL="2057400" indent="-228600" algn="l" defTabSz="914400" rtl="0" eaLnBrk="1" latinLnBrk="0" hangingPunct="1">
-              <a:lnSpc>
-                <a:spcPct val="90000"/>
-              </a:lnSpc>
-              <a:spcBef>
-                <a:spcPts val="500"/>
-              </a:spcBef>
-              <a:buFont typeface="Arial" panose="020B0604020202020204" pitchFamily="34" charset="0"/>
-              <a:buChar char="•"/>
-              <a:defRPr sz="1800" kern="1200">
-                <a:solidFill>
-                  <a:schemeClr val="tx1"/>
-                </a:solidFill>
-                <a:latin typeface="+mn-lt"/>
-                <a:ea typeface="+mn-ea"/>
-                <a:cs typeface="+mn-cs"/>
-              </a:defRPr>
-            </a:lvl5pPr>
-            <a:lvl6pPr marL="2514600" indent="-228600" algn="l" defTabSz="914400" rtl="0" eaLnBrk="1" latinLnBrk="0" hangingPunct="1">
-              <a:lnSpc>
-                <a:spcPct val="90000"/>
-              </a:lnSpc>
-              <a:spcBef>
-                <a:spcPts val="500"/>
-              </a:spcBef>
-              <a:buFont typeface="Arial" panose="020B0604020202020204" pitchFamily="34" charset="0"/>
-              <a:buChar char="•"/>
-              <a:defRPr sz="1800" kern="1200">
-                <a:solidFill>
-                  <a:schemeClr val="tx1"/>
-                </a:solidFill>
-                <a:latin typeface="+mn-lt"/>
-                <a:ea typeface="+mn-ea"/>
-                <a:cs typeface="+mn-cs"/>
-              </a:defRPr>
-            </a:lvl6pPr>
-            <a:lvl7pPr marL="2971800" indent="-228600" algn="l" defTabSz="914400" rtl="0" eaLnBrk="1" latinLnBrk="0" hangingPunct="1">
-              <a:lnSpc>
-                <a:spcPct val="90000"/>
-              </a:lnSpc>
-              <a:spcBef>
-                <a:spcPts val="500"/>
-              </a:spcBef>
-              <a:buFont typeface="Arial" panose="020B0604020202020204" pitchFamily="34" charset="0"/>
-              <a:buChar char="•"/>
-              <a:defRPr sz="1800" kern="1200">
-                <a:solidFill>
-                  <a:schemeClr val="tx1"/>
-                </a:solidFill>
-                <a:latin typeface="+mn-lt"/>
-                <a:ea typeface="+mn-ea"/>
-                <a:cs typeface="+mn-cs"/>
-              </a:defRPr>
-            </a:lvl7pPr>
-            <a:lvl8pPr marL="3429000" indent="-228600" algn="l" defTabSz="914400" rtl="0" eaLnBrk="1" latinLnBrk="0" hangingPunct="1">
-              <a:lnSpc>
-                <a:spcPct val="90000"/>
-              </a:lnSpc>
-              <a:spcBef>
-                <a:spcPts val="500"/>
-              </a:spcBef>
-              <a:buFont typeface="Arial" panose="020B0604020202020204" pitchFamily="34" charset="0"/>
-              <a:buChar char="•"/>
-              <a:defRPr sz="1800" kern="1200">
-                <a:solidFill>
-                  <a:schemeClr val="tx1"/>
-                </a:solidFill>
-                <a:latin typeface="+mn-lt"/>
-                <a:ea typeface="+mn-ea"/>
-                <a:cs typeface="+mn-cs"/>
-              </a:defRPr>
-            </a:lvl8pPr>
-            <a:lvl9pPr marL="3886200" indent="-228600" algn="l" defTabSz="914400" rtl="0" eaLnBrk="1" latinLnBrk="0" hangingPunct="1">
-              <a:lnSpc>
-                <a:spcPct val="90000"/>
-              </a:lnSpc>
-              <a:spcBef>
-                <a:spcPts val="500"/>
-              </a:spcBef>
-              <a:buFont typeface="Arial" panose="020B0604020202020204" pitchFamily="34" charset="0"/>
-              <a:buChar char="•"/>
-              <a:defRPr sz="1800" kern="1200">
-                <a:solidFill>
-                  <a:schemeClr val="tx1"/>
-                </a:solidFill>
-                <a:latin typeface="+mn-lt"/>
-                <a:ea typeface="+mn-ea"/>
-                <a:cs typeface="+mn-cs"/>
-              </a:defRPr>
-            </a:lvl9pPr>
-          </a:lstStyle>
+          <a:bodyPr/>
+          <a:lstStyle/>
           <a:p>
-            <a:pPr marL="0" indent="0" algn="ctr">
-              <a:buNone/>
-            </a:pPr>
-            <a:r>
-              <a:rPr lang="pl-PL" sz="2400" dirty="0">
-                <a:solidFill>
-                  <a:schemeClr val="bg1"/>
-                </a:solidFill>
-              </a:rPr>
-              <a:t>To koniec jednego z czterech bloków eksperymentu. Zaraz zacznie się kolejny. </a:t>
-            </a:r>
-            <a:endParaRPr lang="en-US" sz="2400" dirty="0">
-              <a:solidFill>
-                <a:schemeClr val="bg1"/>
-              </a:solidFill>
-            </a:endParaRPr>
+            <a:r>
+              <a:rPr lang="pl-PL" dirty="0"/>
+              <a:t>Slajdy wewnątrz </a:t>
+            </a:r>
+            <a:r>
+              <a:rPr lang="pl-PL" dirty="0" err="1"/>
+              <a:t>triali</a:t>
+            </a:r>
+            <a:r>
+              <a:rPr lang="pl-PL" dirty="0"/>
+              <a:t> (końce bloków)</a:t>
+            </a:r>
+            <a:endParaRPr lang="en-US" dirty="0"/>
           </a:p>
         </p:txBody>
       </p:sp>
       <p:sp>
         <p:nvSpPr>
-          <p:cNvPr id="2" name="TextBox 1">
+          <p:cNvPr id="3" name="Content Placeholder 2">
             <a:extLst>
               <a:ext uri="{FF2B5EF4-FFF2-40B4-BE49-F238E27FC236}">
-                <a16:creationId xmlns:a16="http://schemas.microsoft.com/office/drawing/2014/main" id="{53F3EEE2-45E7-4906-9DD3-0CFC053FF6C8}"/>
+                <a16:creationId xmlns:a16="http://schemas.microsoft.com/office/drawing/2014/main" id="{4442F038-6072-4A5A-BA30-02286A83305C}"/>
               </a:ext>
             </a:extLst>
           </p:cNvPr>
-          <p:cNvSpPr txBox="1"/>
-          <p:nvPr/>
+          <p:cNvSpPr>
+            <a:spLocks noGrp="1"/>
+          </p:cNvSpPr>
+          <p:nvPr>
+            <p:ph idx="1"/>
+          </p:nvPr>
         </p:nvSpPr>
-        <p:spPr>
-          <a:xfrm>
-            <a:off x="2068354" y="4017177"/>
-            <a:ext cx="8055284" cy="954107"/>
-          </a:xfrm>
-          <a:prstGeom prst="rect">
-            <a:avLst/>
-          </a:prstGeom>
-          <a:noFill/>
-        </p:spPr>
+        <p:spPr/>
         <p:txBody>
-          <a:bodyPr wrap="square" rtlCol="0">
-            <a:spAutoFit/>
-          </a:bodyPr>
+          <a:bodyPr/>
           <a:lstStyle/>
           <a:p>
-            <a:pPr algn="ctr"/>
-            <a:r>
-              <a:rPr lang="pl-PL" sz="2800" dirty="0">
-                <a:solidFill>
-                  <a:schemeClr val="bg1"/>
-                </a:solidFill>
-              </a:rPr>
-              <a:t>Uwaga! Teraz rozkład kolorów zmieni się, i trzeba będzie na nowo przypisać do niego poczucie kontroli.</a:t>
-            </a:r>
-            <a:endParaRPr lang="en-US" sz="2800" dirty="0"/>
+            <a:endParaRPr lang="en-US"/>
           </a:p>
         </p:txBody>
       </p:sp>
     </p:spTree>
     <p:extLst>
       <p:ext uri="{BB962C8B-B14F-4D97-AF65-F5344CB8AC3E}">
-        <p14:creationId xmlns:p14="http://schemas.microsoft.com/office/powerpoint/2010/main" val="73397376"/>
+        <p14:creationId xmlns:p14="http://schemas.microsoft.com/office/powerpoint/2010/main" val="314155207"/>
       </p:ext>
     </p:extLst>
   </p:cSld>
@@ -11317,7 +12047,7 @@
         </p:spPr>
         <p:txBody>
           <a:bodyPr vert="horz" lIns="91440" tIns="45720" rIns="91440" bIns="45720" rtlCol="0">
-            <a:normAutofit lnSpcReduction="10000"/>
+            <a:normAutofit/>
           </a:bodyPr>
           <a:lstStyle>
             <a:lvl1pPr marL="228600" indent="-228600" algn="l" defTabSz="914400" rtl="0" eaLnBrk="1" latinLnBrk="0" hangingPunct="1">
@@ -11491,30 +12221,11 @@
             <a:r>
               <a:rPr lang="pl-PL" sz="2000" dirty="0">
                 <a:solidFill>
-                  <a:srgbClr val="FF0000"/>
-                </a:solidFill>
-              </a:rPr>
-              <a:t>Proszę nacisnąć „L”, aby ROZPOCZĄĆ KOLEJNY BLOK…</a:t>
-            </a:r>
-          </a:p>
-          <a:p>
-            <a:pPr marL="0" indent="0" algn="ctr">
-              <a:buFont typeface="Arial" panose="020B0604020202020204" pitchFamily="34" charset="0"/>
-              <a:buNone/>
-            </a:pPr>
-            <a:r>
-              <a:rPr lang="pl-PL" sz="2000" dirty="0">
-                <a:solidFill>
-                  <a:srgbClr val="FF0000"/>
-                </a:solidFill>
-              </a:rPr>
-              <a:t>lub „D”, aby cofnąć się do poprzedniego slajdu…</a:t>
-            </a:r>
-            <a:endParaRPr lang="en-US" sz="2000" dirty="0">
-              <a:solidFill>
-                <a:srgbClr val="FF0000"/>
-              </a:solidFill>
-            </a:endParaRPr>
+                  <a:schemeClr val="bg1"/>
+                </a:solidFill>
+              </a:rPr>
+              <a:t>Proszę nacisnąć „L”, aby kontynuować…</a:t>
+            </a:r>
           </a:p>
         </p:txBody>
       </p:sp>
@@ -11534,7 +12245,7 @@
         </p:nvSpPr>
         <p:spPr>
           <a:xfrm>
-            <a:off x="1800727" y="3058661"/>
+            <a:off x="1800723" y="1408634"/>
             <a:ext cx="8590546" cy="740677"/>
           </a:xfrm>
           <a:prstGeom prst="rect">
@@ -11543,7 +12254,7 @@
         </p:spPr>
         <p:txBody>
           <a:bodyPr vert="horz" lIns="91440" tIns="45720" rIns="91440" bIns="45720" rtlCol="0">
-            <a:normAutofit lnSpcReduction="10000"/>
+            <a:normAutofit/>
           </a:bodyPr>
           <a:lstStyle>
             <a:lvl1pPr marL="228600" indent="-228600" algn="l" defTabSz="914400" rtl="0" eaLnBrk="1" latinLnBrk="0" hangingPunct="1">
@@ -11720,31 +12431,7 @@
                   <a:schemeClr val="bg1"/>
                 </a:solidFill>
               </a:rPr>
-              <a:t>Proszę</a:t>
-            </a:r>
-            <a:r>
-              <a:rPr lang="en-US" sz="2400" dirty="0">
-                <a:solidFill>
-                  <a:schemeClr val="bg1"/>
-                </a:solidFill>
-              </a:rPr>
-              <a:t> </a:t>
-            </a:r>
-            <a:r>
-              <a:rPr lang="en-US" sz="2400" dirty="0" err="1">
-                <a:solidFill>
-                  <a:schemeClr val="bg1"/>
-                </a:solidFill>
-              </a:rPr>
-              <a:t>teraz</a:t>
-            </a:r>
-            <a:r>
-              <a:rPr lang="pl-PL" sz="2400" dirty="0">
-                <a:solidFill>
-                  <a:schemeClr val="bg1"/>
-                </a:solidFill>
-              </a:rPr>
-              <a:t> położyć palec wskazujący lewej ręki na klawiszu „D” na klawiaturze, a prawej ręki na klawiszu „L”.</a:t>
+              <a:t>Dziękujemy!</a:t>
             </a:r>
             <a:endParaRPr lang="en-US" sz="2400" dirty="0">
               <a:solidFill>
@@ -11754,10 +12441,262 @@
           </a:p>
         </p:txBody>
       </p:sp>
+      <p:sp>
+        <p:nvSpPr>
+          <p:cNvPr id="9" name="Content Placeholder 2">
+            <a:extLst>
+              <a:ext uri="{FF2B5EF4-FFF2-40B4-BE49-F238E27FC236}">
+                <a16:creationId xmlns:a16="http://schemas.microsoft.com/office/drawing/2014/main" id="{6AE46264-68D9-4CE3-A51C-8EC1E628ABC6}"/>
+              </a:ext>
+            </a:extLst>
+          </p:cNvPr>
+          <p:cNvSpPr txBox="1">
+            <a:spLocks/>
+          </p:cNvSpPr>
+          <p:nvPr/>
+        </p:nvSpPr>
+        <p:spPr>
+          <a:xfrm>
+            <a:off x="3031459" y="2476476"/>
+            <a:ext cx="6129074" cy="1078624"/>
+          </a:xfrm>
+          <a:prstGeom prst="rect">
+            <a:avLst/>
+          </a:prstGeom>
+        </p:spPr>
+        <p:txBody>
+          <a:bodyPr vert="horz" lIns="91440" tIns="45720" rIns="91440" bIns="45720" rtlCol="0">
+            <a:normAutofit/>
+          </a:bodyPr>
+          <a:lstStyle>
+            <a:lvl1pPr marL="228600" indent="-228600" algn="l" defTabSz="914400" rtl="0" eaLnBrk="1" latinLnBrk="0" hangingPunct="1">
+              <a:lnSpc>
+                <a:spcPct val="90000"/>
+              </a:lnSpc>
+              <a:spcBef>
+                <a:spcPts val="1000"/>
+              </a:spcBef>
+              <a:buFont typeface="Arial" panose="020B0604020202020204" pitchFamily="34" charset="0"/>
+              <a:buChar char="•"/>
+              <a:defRPr sz="2800" kern="1200">
+                <a:solidFill>
+                  <a:schemeClr val="tx1"/>
+                </a:solidFill>
+                <a:latin typeface="+mn-lt"/>
+                <a:ea typeface="+mn-ea"/>
+                <a:cs typeface="+mn-cs"/>
+              </a:defRPr>
+            </a:lvl1pPr>
+            <a:lvl2pPr marL="685800" indent="-228600" algn="l" defTabSz="914400" rtl="0" eaLnBrk="1" latinLnBrk="0" hangingPunct="1">
+              <a:lnSpc>
+                <a:spcPct val="90000"/>
+              </a:lnSpc>
+              <a:spcBef>
+                <a:spcPts val="500"/>
+              </a:spcBef>
+              <a:buFont typeface="Arial" panose="020B0604020202020204" pitchFamily="34" charset="0"/>
+              <a:buChar char="•"/>
+              <a:defRPr sz="2400" kern="1200">
+                <a:solidFill>
+                  <a:schemeClr val="tx1"/>
+                </a:solidFill>
+                <a:latin typeface="+mn-lt"/>
+                <a:ea typeface="+mn-ea"/>
+                <a:cs typeface="+mn-cs"/>
+              </a:defRPr>
+            </a:lvl2pPr>
+            <a:lvl3pPr marL="1143000" indent="-228600" algn="l" defTabSz="914400" rtl="0" eaLnBrk="1" latinLnBrk="0" hangingPunct="1">
+              <a:lnSpc>
+                <a:spcPct val="90000"/>
+              </a:lnSpc>
+              <a:spcBef>
+                <a:spcPts val="500"/>
+              </a:spcBef>
+              <a:buFont typeface="Arial" panose="020B0604020202020204" pitchFamily="34" charset="0"/>
+              <a:buChar char="•"/>
+              <a:defRPr sz="2000" kern="1200">
+                <a:solidFill>
+                  <a:schemeClr val="tx1"/>
+                </a:solidFill>
+                <a:latin typeface="+mn-lt"/>
+                <a:ea typeface="+mn-ea"/>
+                <a:cs typeface="+mn-cs"/>
+              </a:defRPr>
+            </a:lvl3pPr>
+            <a:lvl4pPr marL="1600200" indent="-228600" algn="l" defTabSz="914400" rtl="0" eaLnBrk="1" latinLnBrk="0" hangingPunct="1">
+              <a:lnSpc>
+                <a:spcPct val="90000"/>
+              </a:lnSpc>
+              <a:spcBef>
+                <a:spcPts val="500"/>
+              </a:spcBef>
+              <a:buFont typeface="Arial" panose="020B0604020202020204" pitchFamily="34" charset="0"/>
+              <a:buChar char="•"/>
+              <a:defRPr sz="1800" kern="1200">
+                <a:solidFill>
+                  <a:schemeClr val="tx1"/>
+                </a:solidFill>
+                <a:latin typeface="+mn-lt"/>
+                <a:ea typeface="+mn-ea"/>
+                <a:cs typeface="+mn-cs"/>
+              </a:defRPr>
+            </a:lvl4pPr>
+            <a:lvl5pPr marL="2057400" indent="-228600" algn="l" defTabSz="914400" rtl="0" eaLnBrk="1" latinLnBrk="0" hangingPunct="1">
+              <a:lnSpc>
+                <a:spcPct val="90000"/>
+              </a:lnSpc>
+              <a:spcBef>
+                <a:spcPts val="500"/>
+              </a:spcBef>
+              <a:buFont typeface="Arial" panose="020B0604020202020204" pitchFamily="34" charset="0"/>
+              <a:buChar char="•"/>
+              <a:defRPr sz="1800" kern="1200">
+                <a:solidFill>
+                  <a:schemeClr val="tx1"/>
+                </a:solidFill>
+                <a:latin typeface="+mn-lt"/>
+                <a:ea typeface="+mn-ea"/>
+                <a:cs typeface="+mn-cs"/>
+              </a:defRPr>
+            </a:lvl5pPr>
+            <a:lvl6pPr marL="2514600" indent="-228600" algn="l" defTabSz="914400" rtl="0" eaLnBrk="1" latinLnBrk="0" hangingPunct="1">
+              <a:lnSpc>
+                <a:spcPct val="90000"/>
+              </a:lnSpc>
+              <a:spcBef>
+                <a:spcPts val="500"/>
+              </a:spcBef>
+              <a:buFont typeface="Arial" panose="020B0604020202020204" pitchFamily="34" charset="0"/>
+              <a:buChar char="•"/>
+              <a:defRPr sz="1800" kern="1200">
+                <a:solidFill>
+                  <a:schemeClr val="tx1"/>
+                </a:solidFill>
+                <a:latin typeface="+mn-lt"/>
+                <a:ea typeface="+mn-ea"/>
+                <a:cs typeface="+mn-cs"/>
+              </a:defRPr>
+            </a:lvl6pPr>
+            <a:lvl7pPr marL="2971800" indent="-228600" algn="l" defTabSz="914400" rtl="0" eaLnBrk="1" latinLnBrk="0" hangingPunct="1">
+              <a:lnSpc>
+                <a:spcPct val="90000"/>
+              </a:lnSpc>
+              <a:spcBef>
+                <a:spcPts val="500"/>
+              </a:spcBef>
+              <a:buFont typeface="Arial" panose="020B0604020202020204" pitchFamily="34" charset="0"/>
+              <a:buChar char="•"/>
+              <a:defRPr sz="1800" kern="1200">
+                <a:solidFill>
+                  <a:schemeClr val="tx1"/>
+                </a:solidFill>
+                <a:latin typeface="+mn-lt"/>
+                <a:ea typeface="+mn-ea"/>
+                <a:cs typeface="+mn-cs"/>
+              </a:defRPr>
+            </a:lvl7pPr>
+            <a:lvl8pPr marL="3429000" indent="-228600" algn="l" defTabSz="914400" rtl="0" eaLnBrk="1" latinLnBrk="0" hangingPunct="1">
+              <a:lnSpc>
+                <a:spcPct val="90000"/>
+              </a:lnSpc>
+              <a:spcBef>
+                <a:spcPts val="500"/>
+              </a:spcBef>
+              <a:buFont typeface="Arial" panose="020B0604020202020204" pitchFamily="34" charset="0"/>
+              <a:buChar char="•"/>
+              <a:defRPr sz="1800" kern="1200">
+                <a:solidFill>
+                  <a:schemeClr val="tx1"/>
+                </a:solidFill>
+                <a:latin typeface="+mn-lt"/>
+                <a:ea typeface="+mn-ea"/>
+                <a:cs typeface="+mn-cs"/>
+              </a:defRPr>
+            </a:lvl8pPr>
+            <a:lvl9pPr marL="3886200" indent="-228600" algn="l" defTabSz="914400" rtl="0" eaLnBrk="1" latinLnBrk="0" hangingPunct="1">
+              <a:lnSpc>
+                <a:spcPct val="90000"/>
+              </a:lnSpc>
+              <a:spcBef>
+                <a:spcPts val="500"/>
+              </a:spcBef>
+              <a:buFont typeface="Arial" panose="020B0604020202020204" pitchFamily="34" charset="0"/>
+              <a:buChar char="•"/>
+              <a:defRPr sz="1800" kern="1200">
+                <a:solidFill>
+                  <a:schemeClr val="tx1"/>
+                </a:solidFill>
+                <a:latin typeface="+mn-lt"/>
+                <a:ea typeface="+mn-ea"/>
+                <a:cs typeface="+mn-cs"/>
+              </a:defRPr>
+            </a:lvl9pPr>
+          </a:lstStyle>
+          <a:p>
+            <a:pPr marL="0" indent="0" algn="ctr">
+              <a:buNone/>
+            </a:pPr>
+            <a:r>
+              <a:rPr lang="pl-PL" sz="2400" dirty="0">
+                <a:solidFill>
+                  <a:schemeClr val="bg1"/>
+                </a:solidFill>
+              </a:rPr>
+              <a:t>To koniec jednego z czterech bloków eksperymentu. Zaraz zacznie się kolejny. </a:t>
+            </a:r>
+            <a:endParaRPr lang="en-US" sz="2400" dirty="0">
+              <a:solidFill>
+                <a:schemeClr val="bg1"/>
+              </a:solidFill>
+            </a:endParaRPr>
+          </a:p>
+        </p:txBody>
+      </p:sp>
+      <p:sp>
+        <p:nvSpPr>
+          <p:cNvPr id="2" name="TextBox 1">
+            <a:extLst>
+              <a:ext uri="{FF2B5EF4-FFF2-40B4-BE49-F238E27FC236}">
+                <a16:creationId xmlns:a16="http://schemas.microsoft.com/office/drawing/2014/main" id="{53F3EEE2-45E7-4906-9DD3-0CFC053FF6C8}"/>
+              </a:ext>
+            </a:extLst>
+          </p:cNvPr>
+          <p:cNvSpPr txBox="1"/>
+          <p:nvPr/>
+        </p:nvSpPr>
+        <p:spPr>
+          <a:xfrm>
+            <a:off x="2068354" y="4017177"/>
+            <a:ext cx="8055284" cy="954107"/>
+          </a:xfrm>
+          <a:prstGeom prst="rect">
+            <a:avLst/>
+          </a:prstGeom>
+          <a:noFill/>
+        </p:spPr>
+        <p:txBody>
+          <a:bodyPr wrap="square" rtlCol="0">
+            <a:spAutoFit/>
+          </a:bodyPr>
+          <a:lstStyle/>
+          <a:p>
+            <a:pPr algn="ctr"/>
+            <a:r>
+              <a:rPr lang="pl-PL" sz="2800" dirty="0">
+                <a:solidFill>
+                  <a:schemeClr val="bg1"/>
+                </a:solidFill>
+              </a:rPr>
+              <a:t>Uwaga! Teraz rozkład kolorów zmieni się, i trzeba będzie na nowo przypisać do niego poczucie kontroli.</a:t>
+            </a:r>
+            <a:endParaRPr lang="en-US" sz="2800" dirty="0"/>
+          </a:p>
+        </p:txBody>
+      </p:sp>
     </p:spTree>
     <p:extLst>
       <p:ext uri="{BB962C8B-B14F-4D97-AF65-F5344CB8AC3E}">
-        <p14:creationId xmlns:p14="http://schemas.microsoft.com/office/powerpoint/2010/main" val="339610578"/>
+        <p14:creationId xmlns:p14="http://schemas.microsoft.com/office/powerpoint/2010/main" val="73397376"/>
       </p:ext>
     </p:extLst>
   </p:cSld>
@@ -11817,7 +12756,7 @@
         </p:spPr>
         <p:txBody>
           <a:bodyPr vert="horz" lIns="91440" tIns="45720" rIns="91440" bIns="45720" rtlCol="0">
-            <a:normAutofit/>
+            <a:normAutofit lnSpcReduction="10000"/>
           </a:bodyPr>
           <a:lstStyle>
             <a:lvl1pPr marL="228600" indent="-228600" algn="l" defTabSz="914400" rtl="0" eaLnBrk="1" latinLnBrk="0" hangingPunct="1">
@@ -11991,11 +12930,30 @@
             <a:r>
               <a:rPr lang="pl-PL" sz="2000" dirty="0">
                 <a:solidFill>
-                  <a:schemeClr val="bg1"/>
-                </a:solidFill>
-              </a:rPr>
-              <a:t>Proszę nacisnąć „L”, aby kontynuować…</a:t>
-            </a:r>
+                  <a:srgbClr val="FF0000"/>
+                </a:solidFill>
+              </a:rPr>
+              <a:t>Proszę nacisnąć „L”, aby ROZPOCZĄĆ KOLEJNY BLOK…</a:t>
+            </a:r>
+          </a:p>
+          <a:p>
+            <a:pPr marL="0" indent="0" algn="ctr">
+              <a:buFont typeface="Arial" panose="020B0604020202020204" pitchFamily="34" charset="0"/>
+              <a:buNone/>
+            </a:pPr>
+            <a:r>
+              <a:rPr lang="pl-PL" sz="2000" dirty="0">
+                <a:solidFill>
+                  <a:srgbClr val="FF0000"/>
+                </a:solidFill>
+              </a:rPr>
+              <a:t>lub „D”, aby cofnąć się do poprzedniego slajdu…</a:t>
+            </a:r>
+            <a:endParaRPr lang="en-US" sz="2000" dirty="0">
+              <a:solidFill>
+                <a:srgbClr val="FF0000"/>
+              </a:solidFill>
+            </a:endParaRPr>
           </a:p>
         </p:txBody>
       </p:sp>
@@ -12015,7 +12973,7 @@
         </p:nvSpPr>
         <p:spPr>
           <a:xfrm>
-            <a:off x="1800723" y="1408634"/>
+            <a:off x="1800727" y="3058661"/>
             <a:ext cx="8590546" cy="740677"/>
           </a:xfrm>
           <a:prstGeom prst="rect">
@@ -12024,7 +12982,7 @@
         </p:spPr>
         <p:txBody>
           <a:bodyPr vert="horz" lIns="91440" tIns="45720" rIns="91440" bIns="45720" rtlCol="0">
-            <a:normAutofit/>
+            <a:normAutofit lnSpcReduction="10000"/>
           </a:bodyPr>
           <a:lstStyle>
             <a:lvl1pPr marL="228600" indent="-228600" algn="l" defTabSz="914400" rtl="0" eaLnBrk="1" latinLnBrk="0" hangingPunct="1">
@@ -12201,211 +13159,32 @@
                   <a:schemeClr val="bg1"/>
                 </a:solidFill>
               </a:rPr>
-              <a:t>To już koniec tej części eksperymentu.</a:t>
-            </a:r>
-            <a:endParaRPr lang="en-US" sz="2400" dirty="0">
-              <a:solidFill>
-                <a:schemeClr val="bg1"/>
-              </a:solidFill>
-            </a:endParaRPr>
-          </a:p>
-        </p:txBody>
-      </p:sp>
-      <p:sp>
-        <p:nvSpPr>
-          <p:cNvPr id="9" name="Content Placeholder 2">
-            <a:extLst>
-              <a:ext uri="{FF2B5EF4-FFF2-40B4-BE49-F238E27FC236}">
-                <a16:creationId xmlns:a16="http://schemas.microsoft.com/office/drawing/2014/main" id="{6AE46264-68D9-4CE3-A51C-8EC1E628ABC6}"/>
-              </a:ext>
-            </a:extLst>
-          </p:cNvPr>
-          <p:cNvSpPr txBox="1">
-            <a:spLocks/>
-          </p:cNvSpPr>
-          <p:nvPr/>
-        </p:nvSpPr>
-        <p:spPr>
-          <a:xfrm>
-            <a:off x="1800723" y="3058661"/>
-            <a:ext cx="8590546" cy="740677"/>
-          </a:xfrm>
-          <a:prstGeom prst="rect">
-            <a:avLst/>
-          </a:prstGeom>
-        </p:spPr>
-        <p:txBody>
-          <a:bodyPr vert="horz" lIns="91440" tIns="45720" rIns="91440" bIns="45720" rtlCol="0">
-            <a:normAutofit/>
-          </a:bodyPr>
-          <a:lstStyle>
-            <a:lvl1pPr marL="228600" indent="-228600" algn="l" defTabSz="914400" rtl="0" eaLnBrk="1" latinLnBrk="0" hangingPunct="1">
-              <a:lnSpc>
-                <a:spcPct val="90000"/>
-              </a:lnSpc>
-              <a:spcBef>
-                <a:spcPts val="1000"/>
-              </a:spcBef>
-              <a:buFont typeface="Arial" panose="020B0604020202020204" pitchFamily="34" charset="0"/>
-              <a:buChar char="•"/>
-              <a:defRPr sz="2800" kern="1200">
-                <a:solidFill>
-                  <a:schemeClr val="tx1"/>
-                </a:solidFill>
-                <a:latin typeface="+mn-lt"/>
-                <a:ea typeface="+mn-ea"/>
-                <a:cs typeface="+mn-cs"/>
-              </a:defRPr>
-            </a:lvl1pPr>
-            <a:lvl2pPr marL="685800" indent="-228600" algn="l" defTabSz="914400" rtl="0" eaLnBrk="1" latinLnBrk="0" hangingPunct="1">
-              <a:lnSpc>
-                <a:spcPct val="90000"/>
-              </a:lnSpc>
-              <a:spcBef>
-                <a:spcPts val="500"/>
-              </a:spcBef>
-              <a:buFont typeface="Arial" panose="020B0604020202020204" pitchFamily="34" charset="0"/>
-              <a:buChar char="•"/>
-              <a:defRPr sz="2400" kern="1200">
-                <a:solidFill>
-                  <a:schemeClr val="tx1"/>
-                </a:solidFill>
-                <a:latin typeface="+mn-lt"/>
-                <a:ea typeface="+mn-ea"/>
-                <a:cs typeface="+mn-cs"/>
-              </a:defRPr>
-            </a:lvl2pPr>
-            <a:lvl3pPr marL="1143000" indent="-228600" algn="l" defTabSz="914400" rtl="0" eaLnBrk="1" latinLnBrk="0" hangingPunct="1">
-              <a:lnSpc>
-                <a:spcPct val="90000"/>
-              </a:lnSpc>
-              <a:spcBef>
-                <a:spcPts val="500"/>
-              </a:spcBef>
-              <a:buFont typeface="Arial" panose="020B0604020202020204" pitchFamily="34" charset="0"/>
-              <a:buChar char="•"/>
-              <a:defRPr sz="2000" kern="1200">
-                <a:solidFill>
-                  <a:schemeClr val="tx1"/>
-                </a:solidFill>
-                <a:latin typeface="+mn-lt"/>
-                <a:ea typeface="+mn-ea"/>
-                <a:cs typeface="+mn-cs"/>
-              </a:defRPr>
-            </a:lvl3pPr>
-            <a:lvl4pPr marL="1600200" indent="-228600" algn="l" defTabSz="914400" rtl="0" eaLnBrk="1" latinLnBrk="0" hangingPunct="1">
-              <a:lnSpc>
-                <a:spcPct val="90000"/>
-              </a:lnSpc>
-              <a:spcBef>
-                <a:spcPts val="500"/>
-              </a:spcBef>
-              <a:buFont typeface="Arial" panose="020B0604020202020204" pitchFamily="34" charset="0"/>
-              <a:buChar char="•"/>
-              <a:defRPr sz="1800" kern="1200">
-                <a:solidFill>
-                  <a:schemeClr val="tx1"/>
-                </a:solidFill>
-                <a:latin typeface="+mn-lt"/>
-                <a:ea typeface="+mn-ea"/>
-                <a:cs typeface="+mn-cs"/>
-              </a:defRPr>
-            </a:lvl4pPr>
-            <a:lvl5pPr marL="2057400" indent="-228600" algn="l" defTabSz="914400" rtl="0" eaLnBrk="1" latinLnBrk="0" hangingPunct="1">
-              <a:lnSpc>
-                <a:spcPct val="90000"/>
-              </a:lnSpc>
-              <a:spcBef>
-                <a:spcPts val="500"/>
-              </a:spcBef>
-              <a:buFont typeface="Arial" panose="020B0604020202020204" pitchFamily="34" charset="0"/>
-              <a:buChar char="•"/>
-              <a:defRPr sz="1800" kern="1200">
-                <a:solidFill>
-                  <a:schemeClr val="tx1"/>
-                </a:solidFill>
-                <a:latin typeface="+mn-lt"/>
-                <a:ea typeface="+mn-ea"/>
-                <a:cs typeface="+mn-cs"/>
-              </a:defRPr>
-            </a:lvl5pPr>
-            <a:lvl6pPr marL="2514600" indent="-228600" algn="l" defTabSz="914400" rtl="0" eaLnBrk="1" latinLnBrk="0" hangingPunct="1">
-              <a:lnSpc>
-                <a:spcPct val="90000"/>
-              </a:lnSpc>
-              <a:spcBef>
-                <a:spcPts val="500"/>
-              </a:spcBef>
-              <a:buFont typeface="Arial" panose="020B0604020202020204" pitchFamily="34" charset="0"/>
-              <a:buChar char="•"/>
-              <a:defRPr sz="1800" kern="1200">
-                <a:solidFill>
-                  <a:schemeClr val="tx1"/>
-                </a:solidFill>
-                <a:latin typeface="+mn-lt"/>
-                <a:ea typeface="+mn-ea"/>
-                <a:cs typeface="+mn-cs"/>
-              </a:defRPr>
-            </a:lvl6pPr>
-            <a:lvl7pPr marL="2971800" indent="-228600" algn="l" defTabSz="914400" rtl="0" eaLnBrk="1" latinLnBrk="0" hangingPunct="1">
-              <a:lnSpc>
-                <a:spcPct val="90000"/>
-              </a:lnSpc>
-              <a:spcBef>
-                <a:spcPts val="500"/>
-              </a:spcBef>
-              <a:buFont typeface="Arial" panose="020B0604020202020204" pitchFamily="34" charset="0"/>
-              <a:buChar char="•"/>
-              <a:defRPr sz="1800" kern="1200">
-                <a:solidFill>
-                  <a:schemeClr val="tx1"/>
-                </a:solidFill>
-                <a:latin typeface="+mn-lt"/>
-                <a:ea typeface="+mn-ea"/>
-                <a:cs typeface="+mn-cs"/>
-              </a:defRPr>
-            </a:lvl7pPr>
-            <a:lvl8pPr marL="3429000" indent="-228600" algn="l" defTabSz="914400" rtl="0" eaLnBrk="1" latinLnBrk="0" hangingPunct="1">
-              <a:lnSpc>
-                <a:spcPct val="90000"/>
-              </a:lnSpc>
-              <a:spcBef>
-                <a:spcPts val="500"/>
-              </a:spcBef>
-              <a:buFont typeface="Arial" panose="020B0604020202020204" pitchFamily="34" charset="0"/>
-              <a:buChar char="•"/>
-              <a:defRPr sz="1800" kern="1200">
-                <a:solidFill>
-                  <a:schemeClr val="tx1"/>
-                </a:solidFill>
-                <a:latin typeface="+mn-lt"/>
-                <a:ea typeface="+mn-ea"/>
-                <a:cs typeface="+mn-cs"/>
-              </a:defRPr>
-            </a:lvl8pPr>
-            <a:lvl9pPr marL="3886200" indent="-228600" algn="l" defTabSz="914400" rtl="0" eaLnBrk="1" latinLnBrk="0" hangingPunct="1">
-              <a:lnSpc>
-                <a:spcPct val="90000"/>
-              </a:lnSpc>
-              <a:spcBef>
-                <a:spcPts val="500"/>
-              </a:spcBef>
-              <a:buFont typeface="Arial" panose="020B0604020202020204" pitchFamily="34" charset="0"/>
-              <a:buChar char="•"/>
-              <a:defRPr sz="1800" kern="1200">
-                <a:solidFill>
-                  <a:schemeClr val="tx1"/>
-                </a:solidFill>
-                <a:latin typeface="+mn-lt"/>
-                <a:ea typeface="+mn-ea"/>
-                <a:cs typeface="+mn-cs"/>
-              </a:defRPr>
-            </a:lvl9pPr>
-          </a:lstStyle>
-          <a:p>
-            <a:pPr marL="0" indent="0" algn="ctr">
-              <a:buNone/>
-            </a:pPr>
+              <a:t>Proszę</a:t>
+            </a:r>
+            <a:r>
+              <a:rPr lang="en-US" sz="2400" dirty="0">
+                <a:solidFill>
+                  <a:schemeClr val="bg1"/>
+                </a:solidFill>
+              </a:rPr>
+              <a:t> </a:t>
+            </a:r>
+            <a:r>
+              <a:rPr lang="en-US" sz="2400" dirty="0" err="1">
+                <a:solidFill>
+                  <a:schemeClr val="bg1"/>
+                </a:solidFill>
+              </a:rPr>
+              <a:t>teraz</a:t>
+            </a:r>
+            <a:r>
+              <a:rPr lang="pl-PL" sz="2400" dirty="0">
+                <a:solidFill>
+                  <a:schemeClr val="bg1"/>
+                </a:solidFill>
+              </a:rPr>
+              <a:t> położyć palec wskazujący lewej ręki na klawiszu „D” na klawiaturze, a prawej ręki na klawiszu „L”.</a:t>
+            </a:r>
             <a:endParaRPr lang="en-US" sz="2400" dirty="0">
               <a:solidFill>
                 <a:schemeClr val="bg1"/>
@@ -12417,7 +13196,7 @@
     </p:spTree>
     <p:extLst>
       <p:ext uri="{BB962C8B-B14F-4D97-AF65-F5344CB8AC3E}">
-        <p14:creationId xmlns:p14="http://schemas.microsoft.com/office/powerpoint/2010/main" val="3762113772"/>
+        <p14:creationId xmlns:p14="http://schemas.microsoft.com/office/powerpoint/2010/main" val="339610578"/>
       </p:ext>
     </p:extLst>
   </p:cSld>
@@ -12675,8 +13454,8 @@
         </p:nvSpPr>
         <p:spPr>
           <a:xfrm>
-            <a:off x="575733" y="342849"/>
-            <a:ext cx="11040533" cy="5431623"/>
+            <a:off x="1800723" y="1408634"/>
+            <a:ext cx="8590546" cy="740677"/>
           </a:xfrm>
           <a:prstGeom prst="rect">
             <a:avLst/>
@@ -12851,49 +13630,17 @@
             </a:lvl9pPr>
           </a:lstStyle>
           <a:p>
-            <a:pPr marL="0" indent="0" algn="just">
+            <a:pPr marL="0" indent="0" algn="ctr">
+              <a:buFont typeface="Arial" panose="020B0604020202020204" pitchFamily="34" charset="0"/>
               <a:buNone/>
             </a:pPr>
-            <a:endParaRPr lang="pl-PL" dirty="0">
-              <a:solidFill>
-                <a:schemeClr val="bg1"/>
-              </a:solidFill>
-            </a:endParaRPr>
-          </a:p>
-          <a:p>
-            <a:pPr marL="0" indent="0" algn="ctr">
-              <a:buNone/>
-            </a:pPr>
-            <a:r>
-              <a:rPr lang="pl-PL" b="1" dirty="0">
+            <a:r>
+              <a:rPr lang="pl-PL" sz="2400" dirty="0">
                 <a:solidFill>
                   <a:schemeClr val="bg1"/>
                 </a:solidFill>
               </a:rPr>
-              <a:t>Informacje dla osoby uczestniczącej w badaniu</a:t>
-            </a:r>
-          </a:p>
-          <a:p>
-            <a:pPr marL="0" indent="0" algn="just">
-              <a:buNone/>
-            </a:pPr>
-            <a:endParaRPr lang="pl-PL" dirty="0">
-              <a:solidFill>
-                <a:schemeClr val="bg1"/>
-              </a:solidFill>
-            </a:endParaRPr>
-          </a:p>
-          <a:p>
-            <a:pPr marL="0" indent="0" algn="just">
-              <a:buNone/>
-            </a:pPr>
-            <a:r>
-              <a:rPr lang="pl-PL" dirty="0">
-                <a:solidFill>
-                  <a:schemeClr val="bg1"/>
-                </a:solidFill>
-              </a:rPr>
-              <a:t>W czasie badania były obecne tak zwane prymy podprogowe, czyli strzałki, które są wyświetlane z taką szybkością, że nie są świadomie dostrzegane, jednak minimalnie wpływają one na wybór naciśniętego guzika (średnio o parę procent częściej naciska się klawisz zgodny z kierunkiem prymy), oraz na szybkość Pani/Pana reakcji (mniej więcej o 1/10 sekundy szybciej naciska się klawisz zgodny z kierunkiem prymy). </a:t>
+              <a:t>To już koniec tej części eksperymentu.</a:t>
             </a:r>
             <a:endParaRPr lang="en-US" sz="2400" dirty="0">
               <a:solidFill>
@@ -13109,6 +13856,698 @@
     </p:spTree>
     <p:extLst>
       <p:ext uri="{BB962C8B-B14F-4D97-AF65-F5344CB8AC3E}">
+        <p14:creationId xmlns:p14="http://schemas.microsoft.com/office/powerpoint/2010/main" val="3762113772"/>
+      </p:ext>
+    </p:extLst>
+  </p:cSld>
+  <p:clrMapOvr>
+    <a:masterClrMapping/>
+  </p:clrMapOvr>
+</p:sld>
+</file>
+
+<file path=ppt/slides/slide23.xml><?xml version="1.0" encoding="utf-8"?>
+<p:sld xmlns:a="http://schemas.openxmlformats.org/drawingml/2006/main" xmlns:r="http://schemas.openxmlformats.org/officeDocument/2006/relationships" xmlns:p="http://schemas.openxmlformats.org/presentationml/2006/main">
+  <p:cSld>
+    <p:bg>
+      <p:bgPr>
+        <a:solidFill>
+          <a:schemeClr val="tx1"/>
+        </a:solidFill>
+        <a:effectLst/>
+      </p:bgPr>
+    </p:bg>
+    <p:spTree>
+      <p:nvGrpSpPr>
+        <p:cNvPr id="1" name=""/>
+        <p:cNvGrpSpPr/>
+        <p:nvPr/>
+      </p:nvGrpSpPr>
+      <p:grpSpPr>
+        <a:xfrm>
+          <a:off x="0" y="0"/>
+          <a:ext cx="0" cy="0"/>
+          <a:chOff x="0" y="0"/>
+          <a:chExt cx="0" cy="0"/>
+        </a:xfrm>
+      </p:grpSpPr>
+      <p:sp>
+        <p:nvSpPr>
+          <p:cNvPr id="4" name="Content Placeholder 2">
+            <a:extLst>
+              <a:ext uri="{FF2B5EF4-FFF2-40B4-BE49-F238E27FC236}">
+                <a16:creationId xmlns:a16="http://schemas.microsoft.com/office/drawing/2014/main" id="{46DF36C4-BF62-41C8-87BC-20EB0ECF88CF}"/>
+              </a:ext>
+            </a:extLst>
+          </p:cNvPr>
+          <p:cNvSpPr txBox="1">
+            <a:spLocks/>
+          </p:cNvSpPr>
+          <p:nvPr/>
+        </p:nvSpPr>
+        <p:spPr>
+          <a:xfrm>
+            <a:off x="838200" y="6039514"/>
+            <a:ext cx="10515600" cy="730253"/>
+          </a:xfrm>
+          <a:prstGeom prst="rect">
+            <a:avLst/>
+          </a:prstGeom>
+        </p:spPr>
+        <p:txBody>
+          <a:bodyPr vert="horz" lIns="91440" tIns="45720" rIns="91440" bIns="45720" rtlCol="0">
+            <a:normAutofit/>
+          </a:bodyPr>
+          <a:lstStyle>
+            <a:lvl1pPr marL="228600" indent="-228600" algn="l" defTabSz="914400" rtl="0" eaLnBrk="1" latinLnBrk="0" hangingPunct="1">
+              <a:lnSpc>
+                <a:spcPct val="90000"/>
+              </a:lnSpc>
+              <a:spcBef>
+                <a:spcPts val="1000"/>
+              </a:spcBef>
+              <a:buFont typeface="Arial" panose="020B0604020202020204" pitchFamily="34" charset="0"/>
+              <a:buChar char="•"/>
+              <a:defRPr sz="2800" kern="1200">
+                <a:solidFill>
+                  <a:schemeClr val="tx1"/>
+                </a:solidFill>
+                <a:latin typeface="+mn-lt"/>
+                <a:ea typeface="+mn-ea"/>
+                <a:cs typeface="+mn-cs"/>
+              </a:defRPr>
+            </a:lvl1pPr>
+            <a:lvl2pPr marL="685800" indent="-228600" algn="l" defTabSz="914400" rtl="0" eaLnBrk="1" latinLnBrk="0" hangingPunct="1">
+              <a:lnSpc>
+                <a:spcPct val="90000"/>
+              </a:lnSpc>
+              <a:spcBef>
+                <a:spcPts val="500"/>
+              </a:spcBef>
+              <a:buFont typeface="Arial" panose="020B0604020202020204" pitchFamily="34" charset="0"/>
+              <a:buChar char="•"/>
+              <a:defRPr sz="2400" kern="1200">
+                <a:solidFill>
+                  <a:schemeClr val="tx1"/>
+                </a:solidFill>
+                <a:latin typeface="+mn-lt"/>
+                <a:ea typeface="+mn-ea"/>
+                <a:cs typeface="+mn-cs"/>
+              </a:defRPr>
+            </a:lvl2pPr>
+            <a:lvl3pPr marL="1143000" indent="-228600" algn="l" defTabSz="914400" rtl="0" eaLnBrk="1" latinLnBrk="0" hangingPunct="1">
+              <a:lnSpc>
+                <a:spcPct val="90000"/>
+              </a:lnSpc>
+              <a:spcBef>
+                <a:spcPts val="500"/>
+              </a:spcBef>
+              <a:buFont typeface="Arial" panose="020B0604020202020204" pitchFamily="34" charset="0"/>
+              <a:buChar char="•"/>
+              <a:defRPr sz="2000" kern="1200">
+                <a:solidFill>
+                  <a:schemeClr val="tx1"/>
+                </a:solidFill>
+                <a:latin typeface="+mn-lt"/>
+                <a:ea typeface="+mn-ea"/>
+                <a:cs typeface="+mn-cs"/>
+              </a:defRPr>
+            </a:lvl3pPr>
+            <a:lvl4pPr marL="1600200" indent="-228600" algn="l" defTabSz="914400" rtl="0" eaLnBrk="1" latinLnBrk="0" hangingPunct="1">
+              <a:lnSpc>
+                <a:spcPct val="90000"/>
+              </a:lnSpc>
+              <a:spcBef>
+                <a:spcPts val="500"/>
+              </a:spcBef>
+              <a:buFont typeface="Arial" panose="020B0604020202020204" pitchFamily="34" charset="0"/>
+              <a:buChar char="•"/>
+              <a:defRPr sz="1800" kern="1200">
+                <a:solidFill>
+                  <a:schemeClr val="tx1"/>
+                </a:solidFill>
+                <a:latin typeface="+mn-lt"/>
+                <a:ea typeface="+mn-ea"/>
+                <a:cs typeface="+mn-cs"/>
+              </a:defRPr>
+            </a:lvl4pPr>
+            <a:lvl5pPr marL="2057400" indent="-228600" algn="l" defTabSz="914400" rtl="0" eaLnBrk="1" latinLnBrk="0" hangingPunct="1">
+              <a:lnSpc>
+                <a:spcPct val="90000"/>
+              </a:lnSpc>
+              <a:spcBef>
+                <a:spcPts val="500"/>
+              </a:spcBef>
+              <a:buFont typeface="Arial" panose="020B0604020202020204" pitchFamily="34" charset="0"/>
+              <a:buChar char="•"/>
+              <a:defRPr sz="1800" kern="1200">
+                <a:solidFill>
+                  <a:schemeClr val="tx1"/>
+                </a:solidFill>
+                <a:latin typeface="+mn-lt"/>
+                <a:ea typeface="+mn-ea"/>
+                <a:cs typeface="+mn-cs"/>
+              </a:defRPr>
+            </a:lvl5pPr>
+            <a:lvl6pPr marL="2514600" indent="-228600" algn="l" defTabSz="914400" rtl="0" eaLnBrk="1" latinLnBrk="0" hangingPunct="1">
+              <a:lnSpc>
+                <a:spcPct val="90000"/>
+              </a:lnSpc>
+              <a:spcBef>
+                <a:spcPts val="500"/>
+              </a:spcBef>
+              <a:buFont typeface="Arial" panose="020B0604020202020204" pitchFamily="34" charset="0"/>
+              <a:buChar char="•"/>
+              <a:defRPr sz="1800" kern="1200">
+                <a:solidFill>
+                  <a:schemeClr val="tx1"/>
+                </a:solidFill>
+                <a:latin typeface="+mn-lt"/>
+                <a:ea typeface="+mn-ea"/>
+                <a:cs typeface="+mn-cs"/>
+              </a:defRPr>
+            </a:lvl6pPr>
+            <a:lvl7pPr marL="2971800" indent="-228600" algn="l" defTabSz="914400" rtl="0" eaLnBrk="1" latinLnBrk="0" hangingPunct="1">
+              <a:lnSpc>
+                <a:spcPct val="90000"/>
+              </a:lnSpc>
+              <a:spcBef>
+                <a:spcPts val="500"/>
+              </a:spcBef>
+              <a:buFont typeface="Arial" panose="020B0604020202020204" pitchFamily="34" charset="0"/>
+              <a:buChar char="•"/>
+              <a:defRPr sz="1800" kern="1200">
+                <a:solidFill>
+                  <a:schemeClr val="tx1"/>
+                </a:solidFill>
+                <a:latin typeface="+mn-lt"/>
+                <a:ea typeface="+mn-ea"/>
+                <a:cs typeface="+mn-cs"/>
+              </a:defRPr>
+            </a:lvl7pPr>
+            <a:lvl8pPr marL="3429000" indent="-228600" algn="l" defTabSz="914400" rtl="0" eaLnBrk="1" latinLnBrk="0" hangingPunct="1">
+              <a:lnSpc>
+                <a:spcPct val="90000"/>
+              </a:lnSpc>
+              <a:spcBef>
+                <a:spcPts val="500"/>
+              </a:spcBef>
+              <a:buFont typeface="Arial" panose="020B0604020202020204" pitchFamily="34" charset="0"/>
+              <a:buChar char="•"/>
+              <a:defRPr sz="1800" kern="1200">
+                <a:solidFill>
+                  <a:schemeClr val="tx1"/>
+                </a:solidFill>
+                <a:latin typeface="+mn-lt"/>
+                <a:ea typeface="+mn-ea"/>
+                <a:cs typeface="+mn-cs"/>
+              </a:defRPr>
+            </a:lvl8pPr>
+            <a:lvl9pPr marL="3886200" indent="-228600" algn="l" defTabSz="914400" rtl="0" eaLnBrk="1" latinLnBrk="0" hangingPunct="1">
+              <a:lnSpc>
+                <a:spcPct val="90000"/>
+              </a:lnSpc>
+              <a:spcBef>
+                <a:spcPts val="500"/>
+              </a:spcBef>
+              <a:buFont typeface="Arial" panose="020B0604020202020204" pitchFamily="34" charset="0"/>
+              <a:buChar char="•"/>
+              <a:defRPr sz="1800" kern="1200">
+                <a:solidFill>
+                  <a:schemeClr val="tx1"/>
+                </a:solidFill>
+                <a:latin typeface="+mn-lt"/>
+                <a:ea typeface="+mn-ea"/>
+                <a:cs typeface="+mn-cs"/>
+              </a:defRPr>
+            </a:lvl9pPr>
+          </a:lstStyle>
+          <a:p>
+            <a:pPr marL="0" indent="0" algn="ctr">
+              <a:buFont typeface="Arial" panose="020B0604020202020204" pitchFamily="34" charset="0"/>
+              <a:buNone/>
+            </a:pPr>
+            <a:r>
+              <a:rPr lang="pl-PL" sz="2000" dirty="0">
+                <a:solidFill>
+                  <a:schemeClr val="bg1"/>
+                </a:solidFill>
+              </a:rPr>
+              <a:t>Proszę nacisnąć „L”, aby kontynuować…</a:t>
+            </a:r>
+          </a:p>
+        </p:txBody>
+      </p:sp>
+      <p:sp>
+        <p:nvSpPr>
+          <p:cNvPr id="7" name="Content Placeholder 2">
+            <a:extLst>
+              <a:ext uri="{FF2B5EF4-FFF2-40B4-BE49-F238E27FC236}">
+                <a16:creationId xmlns:a16="http://schemas.microsoft.com/office/drawing/2014/main" id="{02466EF3-302C-4960-8543-BE397448108A}"/>
+              </a:ext>
+            </a:extLst>
+          </p:cNvPr>
+          <p:cNvSpPr txBox="1">
+            <a:spLocks/>
+          </p:cNvSpPr>
+          <p:nvPr/>
+        </p:nvSpPr>
+        <p:spPr>
+          <a:xfrm>
+            <a:off x="575733" y="342849"/>
+            <a:ext cx="11040533" cy="5431623"/>
+          </a:xfrm>
+          <a:prstGeom prst="rect">
+            <a:avLst/>
+          </a:prstGeom>
+        </p:spPr>
+        <p:txBody>
+          <a:bodyPr vert="horz" lIns="91440" tIns="45720" rIns="91440" bIns="45720" rtlCol="0">
+            <a:normAutofit/>
+          </a:bodyPr>
+          <a:lstStyle>
+            <a:lvl1pPr marL="228600" indent="-228600" algn="l" defTabSz="914400" rtl="0" eaLnBrk="1" latinLnBrk="0" hangingPunct="1">
+              <a:lnSpc>
+                <a:spcPct val="90000"/>
+              </a:lnSpc>
+              <a:spcBef>
+                <a:spcPts val="1000"/>
+              </a:spcBef>
+              <a:buFont typeface="Arial" panose="020B0604020202020204" pitchFamily="34" charset="0"/>
+              <a:buChar char="•"/>
+              <a:defRPr sz="2800" kern="1200">
+                <a:solidFill>
+                  <a:schemeClr val="tx1"/>
+                </a:solidFill>
+                <a:latin typeface="+mn-lt"/>
+                <a:ea typeface="+mn-ea"/>
+                <a:cs typeface="+mn-cs"/>
+              </a:defRPr>
+            </a:lvl1pPr>
+            <a:lvl2pPr marL="685800" indent="-228600" algn="l" defTabSz="914400" rtl="0" eaLnBrk="1" latinLnBrk="0" hangingPunct="1">
+              <a:lnSpc>
+                <a:spcPct val="90000"/>
+              </a:lnSpc>
+              <a:spcBef>
+                <a:spcPts val="500"/>
+              </a:spcBef>
+              <a:buFont typeface="Arial" panose="020B0604020202020204" pitchFamily="34" charset="0"/>
+              <a:buChar char="•"/>
+              <a:defRPr sz="2400" kern="1200">
+                <a:solidFill>
+                  <a:schemeClr val="tx1"/>
+                </a:solidFill>
+                <a:latin typeface="+mn-lt"/>
+                <a:ea typeface="+mn-ea"/>
+                <a:cs typeface="+mn-cs"/>
+              </a:defRPr>
+            </a:lvl2pPr>
+            <a:lvl3pPr marL="1143000" indent="-228600" algn="l" defTabSz="914400" rtl="0" eaLnBrk="1" latinLnBrk="0" hangingPunct="1">
+              <a:lnSpc>
+                <a:spcPct val="90000"/>
+              </a:lnSpc>
+              <a:spcBef>
+                <a:spcPts val="500"/>
+              </a:spcBef>
+              <a:buFont typeface="Arial" panose="020B0604020202020204" pitchFamily="34" charset="0"/>
+              <a:buChar char="•"/>
+              <a:defRPr sz="2000" kern="1200">
+                <a:solidFill>
+                  <a:schemeClr val="tx1"/>
+                </a:solidFill>
+                <a:latin typeface="+mn-lt"/>
+                <a:ea typeface="+mn-ea"/>
+                <a:cs typeface="+mn-cs"/>
+              </a:defRPr>
+            </a:lvl3pPr>
+            <a:lvl4pPr marL="1600200" indent="-228600" algn="l" defTabSz="914400" rtl="0" eaLnBrk="1" latinLnBrk="0" hangingPunct="1">
+              <a:lnSpc>
+                <a:spcPct val="90000"/>
+              </a:lnSpc>
+              <a:spcBef>
+                <a:spcPts val="500"/>
+              </a:spcBef>
+              <a:buFont typeface="Arial" panose="020B0604020202020204" pitchFamily="34" charset="0"/>
+              <a:buChar char="•"/>
+              <a:defRPr sz="1800" kern="1200">
+                <a:solidFill>
+                  <a:schemeClr val="tx1"/>
+                </a:solidFill>
+                <a:latin typeface="+mn-lt"/>
+                <a:ea typeface="+mn-ea"/>
+                <a:cs typeface="+mn-cs"/>
+              </a:defRPr>
+            </a:lvl4pPr>
+            <a:lvl5pPr marL="2057400" indent="-228600" algn="l" defTabSz="914400" rtl="0" eaLnBrk="1" latinLnBrk="0" hangingPunct="1">
+              <a:lnSpc>
+                <a:spcPct val="90000"/>
+              </a:lnSpc>
+              <a:spcBef>
+                <a:spcPts val="500"/>
+              </a:spcBef>
+              <a:buFont typeface="Arial" panose="020B0604020202020204" pitchFamily="34" charset="0"/>
+              <a:buChar char="•"/>
+              <a:defRPr sz="1800" kern="1200">
+                <a:solidFill>
+                  <a:schemeClr val="tx1"/>
+                </a:solidFill>
+                <a:latin typeface="+mn-lt"/>
+                <a:ea typeface="+mn-ea"/>
+                <a:cs typeface="+mn-cs"/>
+              </a:defRPr>
+            </a:lvl5pPr>
+            <a:lvl6pPr marL="2514600" indent="-228600" algn="l" defTabSz="914400" rtl="0" eaLnBrk="1" latinLnBrk="0" hangingPunct="1">
+              <a:lnSpc>
+                <a:spcPct val="90000"/>
+              </a:lnSpc>
+              <a:spcBef>
+                <a:spcPts val="500"/>
+              </a:spcBef>
+              <a:buFont typeface="Arial" panose="020B0604020202020204" pitchFamily="34" charset="0"/>
+              <a:buChar char="•"/>
+              <a:defRPr sz="1800" kern="1200">
+                <a:solidFill>
+                  <a:schemeClr val="tx1"/>
+                </a:solidFill>
+                <a:latin typeface="+mn-lt"/>
+                <a:ea typeface="+mn-ea"/>
+                <a:cs typeface="+mn-cs"/>
+              </a:defRPr>
+            </a:lvl6pPr>
+            <a:lvl7pPr marL="2971800" indent="-228600" algn="l" defTabSz="914400" rtl="0" eaLnBrk="1" latinLnBrk="0" hangingPunct="1">
+              <a:lnSpc>
+                <a:spcPct val="90000"/>
+              </a:lnSpc>
+              <a:spcBef>
+                <a:spcPts val="500"/>
+              </a:spcBef>
+              <a:buFont typeface="Arial" panose="020B0604020202020204" pitchFamily="34" charset="0"/>
+              <a:buChar char="•"/>
+              <a:defRPr sz="1800" kern="1200">
+                <a:solidFill>
+                  <a:schemeClr val="tx1"/>
+                </a:solidFill>
+                <a:latin typeface="+mn-lt"/>
+                <a:ea typeface="+mn-ea"/>
+                <a:cs typeface="+mn-cs"/>
+              </a:defRPr>
+            </a:lvl7pPr>
+            <a:lvl8pPr marL="3429000" indent="-228600" algn="l" defTabSz="914400" rtl="0" eaLnBrk="1" latinLnBrk="0" hangingPunct="1">
+              <a:lnSpc>
+                <a:spcPct val="90000"/>
+              </a:lnSpc>
+              <a:spcBef>
+                <a:spcPts val="500"/>
+              </a:spcBef>
+              <a:buFont typeface="Arial" panose="020B0604020202020204" pitchFamily="34" charset="0"/>
+              <a:buChar char="•"/>
+              <a:defRPr sz="1800" kern="1200">
+                <a:solidFill>
+                  <a:schemeClr val="tx1"/>
+                </a:solidFill>
+                <a:latin typeface="+mn-lt"/>
+                <a:ea typeface="+mn-ea"/>
+                <a:cs typeface="+mn-cs"/>
+              </a:defRPr>
+            </a:lvl8pPr>
+            <a:lvl9pPr marL="3886200" indent="-228600" algn="l" defTabSz="914400" rtl="0" eaLnBrk="1" latinLnBrk="0" hangingPunct="1">
+              <a:lnSpc>
+                <a:spcPct val="90000"/>
+              </a:lnSpc>
+              <a:spcBef>
+                <a:spcPts val="500"/>
+              </a:spcBef>
+              <a:buFont typeface="Arial" panose="020B0604020202020204" pitchFamily="34" charset="0"/>
+              <a:buChar char="•"/>
+              <a:defRPr sz="1800" kern="1200">
+                <a:solidFill>
+                  <a:schemeClr val="tx1"/>
+                </a:solidFill>
+                <a:latin typeface="+mn-lt"/>
+                <a:ea typeface="+mn-ea"/>
+                <a:cs typeface="+mn-cs"/>
+              </a:defRPr>
+            </a:lvl9pPr>
+          </a:lstStyle>
+          <a:p>
+            <a:pPr marL="0" indent="0" algn="just">
+              <a:buNone/>
+            </a:pPr>
+            <a:endParaRPr lang="pl-PL" dirty="0">
+              <a:solidFill>
+                <a:schemeClr val="bg1"/>
+              </a:solidFill>
+            </a:endParaRPr>
+          </a:p>
+          <a:p>
+            <a:pPr marL="0" indent="0" algn="ctr">
+              <a:buNone/>
+            </a:pPr>
+            <a:r>
+              <a:rPr lang="pl-PL" b="1" dirty="0">
+                <a:solidFill>
+                  <a:schemeClr val="bg1"/>
+                </a:solidFill>
+              </a:rPr>
+              <a:t>Informacje dla osoby uczestniczącej w badaniu</a:t>
+            </a:r>
+          </a:p>
+          <a:p>
+            <a:pPr marL="0" indent="0" algn="just">
+              <a:buNone/>
+            </a:pPr>
+            <a:endParaRPr lang="pl-PL" dirty="0">
+              <a:solidFill>
+                <a:schemeClr val="bg1"/>
+              </a:solidFill>
+            </a:endParaRPr>
+          </a:p>
+          <a:p>
+            <a:pPr marL="0" indent="0" algn="just">
+              <a:buNone/>
+            </a:pPr>
+            <a:r>
+              <a:rPr lang="pl-PL" dirty="0">
+                <a:solidFill>
+                  <a:schemeClr val="bg1"/>
+                </a:solidFill>
+              </a:rPr>
+              <a:t>W czasie badania były obecne tak zwane prymy podprogowe, czyli strzałki, które są wyświetlane z taką szybkością, że nie są świadomie dostrzegane, jednak minimalnie wpływają one na wybór naciśniętego guzika (średnio o parę procent częściej naciska się klawisz zgodny z kierunkiem prymy), oraz na szybkość Pani/Pana reakcji (mniej więcej o 1/10 sekundy szybciej naciska się klawisz zgodny z kierunkiem prymy). </a:t>
+            </a:r>
+            <a:endParaRPr lang="en-US" sz="2400" dirty="0">
+              <a:solidFill>
+                <a:schemeClr val="bg1"/>
+              </a:solidFill>
+            </a:endParaRPr>
+          </a:p>
+        </p:txBody>
+      </p:sp>
+      <p:sp>
+        <p:nvSpPr>
+          <p:cNvPr id="9" name="Content Placeholder 2">
+            <a:extLst>
+              <a:ext uri="{FF2B5EF4-FFF2-40B4-BE49-F238E27FC236}">
+                <a16:creationId xmlns:a16="http://schemas.microsoft.com/office/drawing/2014/main" id="{6AE46264-68D9-4CE3-A51C-8EC1E628ABC6}"/>
+              </a:ext>
+            </a:extLst>
+          </p:cNvPr>
+          <p:cNvSpPr txBox="1">
+            <a:spLocks/>
+          </p:cNvSpPr>
+          <p:nvPr/>
+        </p:nvSpPr>
+        <p:spPr>
+          <a:xfrm>
+            <a:off x="1800723" y="3058661"/>
+            <a:ext cx="8590546" cy="740677"/>
+          </a:xfrm>
+          <a:prstGeom prst="rect">
+            <a:avLst/>
+          </a:prstGeom>
+        </p:spPr>
+        <p:txBody>
+          <a:bodyPr vert="horz" lIns="91440" tIns="45720" rIns="91440" bIns="45720" rtlCol="0">
+            <a:normAutofit/>
+          </a:bodyPr>
+          <a:lstStyle>
+            <a:lvl1pPr marL="228600" indent="-228600" algn="l" defTabSz="914400" rtl="0" eaLnBrk="1" latinLnBrk="0" hangingPunct="1">
+              <a:lnSpc>
+                <a:spcPct val="90000"/>
+              </a:lnSpc>
+              <a:spcBef>
+                <a:spcPts val="1000"/>
+              </a:spcBef>
+              <a:buFont typeface="Arial" panose="020B0604020202020204" pitchFamily="34" charset="0"/>
+              <a:buChar char="•"/>
+              <a:defRPr sz="2800" kern="1200">
+                <a:solidFill>
+                  <a:schemeClr val="tx1"/>
+                </a:solidFill>
+                <a:latin typeface="+mn-lt"/>
+                <a:ea typeface="+mn-ea"/>
+                <a:cs typeface="+mn-cs"/>
+              </a:defRPr>
+            </a:lvl1pPr>
+            <a:lvl2pPr marL="685800" indent="-228600" algn="l" defTabSz="914400" rtl="0" eaLnBrk="1" latinLnBrk="0" hangingPunct="1">
+              <a:lnSpc>
+                <a:spcPct val="90000"/>
+              </a:lnSpc>
+              <a:spcBef>
+                <a:spcPts val="500"/>
+              </a:spcBef>
+              <a:buFont typeface="Arial" panose="020B0604020202020204" pitchFamily="34" charset="0"/>
+              <a:buChar char="•"/>
+              <a:defRPr sz="2400" kern="1200">
+                <a:solidFill>
+                  <a:schemeClr val="tx1"/>
+                </a:solidFill>
+                <a:latin typeface="+mn-lt"/>
+                <a:ea typeface="+mn-ea"/>
+                <a:cs typeface="+mn-cs"/>
+              </a:defRPr>
+            </a:lvl2pPr>
+            <a:lvl3pPr marL="1143000" indent="-228600" algn="l" defTabSz="914400" rtl="0" eaLnBrk="1" latinLnBrk="0" hangingPunct="1">
+              <a:lnSpc>
+                <a:spcPct val="90000"/>
+              </a:lnSpc>
+              <a:spcBef>
+                <a:spcPts val="500"/>
+              </a:spcBef>
+              <a:buFont typeface="Arial" panose="020B0604020202020204" pitchFamily="34" charset="0"/>
+              <a:buChar char="•"/>
+              <a:defRPr sz="2000" kern="1200">
+                <a:solidFill>
+                  <a:schemeClr val="tx1"/>
+                </a:solidFill>
+                <a:latin typeface="+mn-lt"/>
+                <a:ea typeface="+mn-ea"/>
+                <a:cs typeface="+mn-cs"/>
+              </a:defRPr>
+            </a:lvl3pPr>
+            <a:lvl4pPr marL="1600200" indent="-228600" algn="l" defTabSz="914400" rtl="0" eaLnBrk="1" latinLnBrk="0" hangingPunct="1">
+              <a:lnSpc>
+                <a:spcPct val="90000"/>
+              </a:lnSpc>
+              <a:spcBef>
+                <a:spcPts val="500"/>
+              </a:spcBef>
+              <a:buFont typeface="Arial" panose="020B0604020202020204" pitchFamily="34" charset="0"/>
+              <a:buChar char="•"/>
+              <a:defRPr sz="1800" kern="1200">
+                <a:solidFill>
+                  <a:schemeClr val="tx1"/>
+                </a:solidFill>
+                <a:latin typeface="+mn-lt"/>
+                <a:ea typeface="+mn-ea"/>
+                <a:cs typeface="+mn-cs"/>
+              </a:defRPr>
+            </a:lvl4pPr>
+            <a:lvl5pPr marL="2057400" indent="-228600" algn="l" defTabSz="914400" rtl="0" eaLnBrk="1" latinLnBrk="0" hangingPunct="1">
+              <a:lnSpc>
+                <a:spcPct val="90000"/>
+              </a:lnSpc>
+              <a:spcBef>
+                <a:spcPts val="500"/>
+              </a:spcBef>
+              <a:buFont typeface="Arial" panose="020B0604020202020204" pitchFamily="34" charset="0"/>
+              <a:buChar char="•"/>
+              <a:defRPr sz="1800" kern="1200">
+                <a:solidFill>
+                  <a:schemeClr val="tx1"/>
+                </a:solidFill>
+                <a:latin typeface="+mn-lt"/>
+                <a:ea typeface="+mn-ea"/>
+                <a:cs typeface="+mn-cs"/>
+              </a:defRPr>
+            </a:lvl5pPr>
+            <a:lvl6pPr marL="2514600" indent="-228600" algn="l" defTabSz="914400" rtl="0" eaLnBrk="1" latinLnBrk="0" hangingPunct="1">
+              <a:lnSpc>
+                <a:spcPct val="90000"/>
+              </a:lnSpc>
+              <a:spcBef>
+                <a:spcPts val="500"/>
+              </a:spcBef>
+              <a:buFont typeface="Arial" panose="020B0604020202020204" pitchFamily="34" charset="0"/>
+              <a:buChar char="•"/>
+              <a:defRPr sz="1800" kern="1200">
+                <a:solidFill>
+                  <a:schemeClr val="tx1"/>
+                </a:solidFill>
+                <a:latin typeface="+mn-lt"/>
+                <a:ea typeface="+mn-ea"/>
+                <a:cs typeface="+mn-cs"/>
+              </a:defRPr>
+            </a:lvl6pPr>
+            <a:lvl7pPr marL="2971800" indent="-228600" algn="l" defTabSz="914400" rtl="0" eaLnBrk="1" latinLnBrk="0" hangingPunct="1">
+              <a:lnSpc>
+                <a:spcPct val="90000"/>
+              </a:lnSpc>
+              <a:spcBef>
+                <a:spcPts val="500"/>
+              </a:spcBef>
+              <a:buFont typeface="Arial" panose="020B0604020202020204" pitchFamily="34" charset="0"/>
+              <a:buChar char="•"/>
+              <a:defRPr sz="1800" kern="1200">
+                <a:solidFill>
+                  <a:schemeClr val="tx1"/>
+                </a:solidFill>
+                <a:latin typeface="+mn-lt"/>
+                <a:ea typeface="+mn-ea"/>
+                <a:cs typeface="+mn-cs"/>
+              </a:defRPr>
+            </a:lvl7pPr>
+            <a:lvl8pPr marL="3429000" indent="-228600" algn="l" defTabSz="914400" rtl="0" eaLnBrk="1" latinLnBrk="0" hangingPunct="1">
+              <a:lnSpc>
+                <a:spcPct val="90000"/>
+              </a:lnSpc>
+              <a:spcBef>
+                <a:spcPts val="500"/>
+              </a:spcBef>
+              <a:buFont typeface="Arial" panose="020B0604020202020204" pitchFamily="34" charset="0"/>
+              <a:buChar char="•"/>
+              <a:defRPr sz="1800" kern="1200">
+                <a:solidFill>
+                  <a:schemeClr val="tx1"/>
+                </a:solidFill>
+                <a:latin typeface="+mn-lt"/>
+                <a:ea typeface="+mn-ea"/>
+                <a:cs typeface="+mn-cs"/>
+              </a:defRPr>
+            </a:lvl8pPr>
+            <a:lvl9pPr marL="3886200" indent="-228600" algn="l" defTabSz="914400" rtl="0" eaLnBrk="1" latinLnBrk="0" hangingPunct="1">
+              <a:lnSpc>
+                <a:spcPct val="90000"/>
+              </a:lnSpc>
+              <a:spcBef>
+                <a:spcPts val="500"/>
+              </a:spcBef>
+              <a:buFont typeface="Arial" panose="020B0604020202020204" pitchFamily="34" charset="0"/>
+              <a:buChar char="•"/>
+              <a:defRPr sz="1800" kern="1200">
+                <a:solidFill>
+                  <a:schemeClr val="tx1"/>
+                </a:solidFill>
+                <a:latin typeface="+mn-lt"/>
+                <a:ea typeface="+mn-ea"/>
+                <a:cs typeface="+mn-cs"/>
+              </a:defRPr>
+            </a:lvl9pPr>
+          </a:lstStyle>
+          <a:p>
+            <a:pPr marL="0" indent="0" algn="ctr">
+              <a:buNone/>
+            </a:pPr>
+            <a:endParaRPr lang="en-US" sz="2400" dirty="0">
+              <a:solidFill>
+                <a:schemeClr val="bg1"/>
+              </a:solidFill>
+            </a:endParaRPr>
+          </a:p>
+        </p:txBody>
+      </p:sp>
+    </p:spTree>
+    <p:extLst>
+      <p:ext uri="{BB962C8B-B14F-4D97-AF65-F5344CB8AC3E}">
         <p14:creationId xmlns:p14="http://schemas.microsoft.com/office/powerpoint/2010/main" val="4132754944"/>
       </p:ext>
     </p:extLst>
@@ -13119,7 +14558,7 @@
 </p:sld>
 </file>
 
-<file path=ppt/slides/slide23.xml><?xml version="1.0" encoding="utf-8"?>
+<file path=ppt/slides/slide24.xml><?xml version="1.0" encoding="utf-8"?>
 <p:sld xmlns:a="http://schemas.openxmlformats.org/drawingml/2006/main" xmlns:r="http://schemas.openxmlformats.org/officeDocument/2006/relationships" xmlns:p="http://schemas.openxmlformats.org/presentationml/2006/main">
   <p:cSld>
     <p:bg>
@@ -13902,7 +15341,7 @@
 </p:sld>
 </file>
 
-<file path=ppt/slides/slide24.xml><?xml version="1.0" encoding="utf-8"?>
+<file path=ppt/slides/slide25.xml><?xml version="1.0" encoding="utf-8"?>
 <p:sld xmlns:a="http://schemas.openxmlformats.org/drawingml/2006/main" xmlns:r="http://schemas.openxmlformats.org/officeDocument/2006/relationships" xmlns:p="http://schemas.openxmlformats.org/presentationml/2006/main" show="0">
   <p:cSld>
     <p:bg>

</xml_diff>